<commit_message>
Docker Generelle Infrastruktur Basis Deployment Strategien
</commit_message>
<xml_diff>
--- a/slides/Tag-3_1-Docker.pptx
+++ b/slides/Tag-3_1-Docker.pptx
@@ -6,26 +6,29 @@
     <p:sldMasterId id="2147483649" r:id="rId2"/>
   </p:sldMasterIdLst>
   <p:notesMasterIdLst>
-    <p:notesMasterId r:id="rId17"/>
+    <p:notesMasterId r:id="rId20"/>
   </p:notesMasterIdLst>
   <p:handoutMasterIdLst>
-    <p:handoutMasterId r:id="rId18"/>
+    <p:handoutMasterId r:id="rId21"/>
   </p:handoutMasterIdLst>
   <p:sldIdLst>
     <p:sldId id="289" r:id="rId3"/>
     <p:sldId id="295" r:id="rId4"/>
     <p:sldId id="294" r:id="rId5"/>
-    <p:sldId id="293" r:id="rId6"/>
-    <p:sldId id="296" r:id="rId7"/>
-    <p:sldId id="298" r:id="rId8"/>
-    <p:sldId id="299" r:id="rId9"/>
-    <p:sldId id="300" r:id="rId10"/>
-    <p:sldId id="301" r:id="rId11"/>
-    <p:sldId id="302" r:id="rId12"/>
-    <p:sldId id="303" r:id="rId13"/>
-    <p:sldId id="305" r:id="rId14"/>
-    <p:sldId id="306" r:id="rId15"/>
-    <p:sldId id="304" r:id="rId16"/>
+    <p:sldId id="308" r:id="rId6"/>
+    <p:sldId id="309" r:id="rId7"/>
+    <p:sldId id="293" r:id="rId8"/>
+    <p:sldId id="296" r:id="rId9"/>
+    <p:sldId id="298" r:id="rId10"/>
+    <p:sldId id="299" r:id="rId11"/>
+    <p:sldId id="300" r:id="rId12"/>
+    <p:sldId id="301" r:id="rId13"/>
+    <p:sldId id="302" r:id="rId14"/>
+    <p:sldId id="303" r:id="rId15"/>
+    <p:sldId id="305" r:id="rId16"/>
+    <p:sldId id="306" r:id="rId17"/>
+    <p:sldId id="307" r:id="rId18"/>
+    <p:sldId id="304" r:id="rId19"/>
   </p:sldIdLst>
   <p:sldSz cx="9144000" cy="6858000" type="screen4x3"/>
   <p:notesSz cx="6784975" cy="9921875"/>
@@ -1169,7 +1172,7 @@
             <a:fld id="{18182567-388C-4D33-8B7B-A651F195F118}" type="slidenum">
               <a:rPr lang="de-DE" altLang="de-DE" smtClean="0"/>
               <a:pPr/>
-              <a:t>9</a:t>
+              <a:t>11</a:t>
             </a:fld>
             <a:endParaRPr lang="de-DE" altLang="de-DE"/>
           </a:p>
@@ -1537,7 +1540,7 @@
               <a:pPr algn="ctr">
                 <a:defRPr/>
               </a:pPr>
-              <a:t>28.05.2024</a:t>
+              <a:t>29.05.2024</a:t>
             </a:fld>
             <a:endParaRPr lang="de-DE" sz="1000">
               <a:solidFill>
@@ -3584,6 +3587,585 @@
           <p:cNvPr id="2" name="Titel 1">
             <a:extLst>
               <a:ext uri="{FF2B5EF4-FFF2-40B4-BE49-F238E27FC236}">
+                <a16:creationId xmlns:a16="http://schemas.microsoft.com/office/drawing/2014/main" id="{850FF3C7-B3ED-0A8B-5D14-2B093646715A}"/>
+              </a:ext>
+            </a:extLst>
+          </p:cNvPr>
+          <p:cNvSpPr>
+            <a:spLocks noGrp="1"/>
+          </p:cNvSpPr>
+          <p:nvPr>
+            <p:ph type="title"/>
+          </p:nvPr>
+        </p:nvSpPr>
+        <p:spPr/>
+        <p:txBody>
+          <a:bodyPr/>
+          <a:lstStyle/>
+          <a:p>
+            <a:r>
+              <a:rPr lang="de-DE" altLang="de-DE" dirty="0"/>
+              <a:t>Lokale Entwicklung mit Docker</a:t>
+            </a:r>
+            <a:endParaRPr lang="de-DE" dirty="0"/>
+          </a:p>
+        </p:txBody>
+      </p:sp>
+      <p:sp>
+        <p:nvSpPr>
+          <p:cNvPr id="3" name="Inhaltsplatzhalter 2">
+            <a:extLst>
+              <a:ext uri="{FF2B5EF4-FFF2-40B4-BE49-F238E27FC236}">
+                <a16:creationId xmlns:a16="http://schemas.microsoft.com/office/drawing/2014/main" id="{0DC67BCE-F3AB-A77C-5BBC-4F0D1EB74590}"/>
+              </a:ext>
+            </a:extLst>
+          </p:cNvPr>
+          <p:cNvSpPr>
+            <a:spLocks noGrp="1"/>
+          </p:cNvSpPr>
+          <p:nvPr>
+            <p:ph idx="1"/>
+          </p:nvPr>
+        </p:nvSpPr>
+        <p:spPr>
+          <a:xfrm>
+            <a:off x="303213" y="2996952"/>
+            <a:ext cx="8516937" cy="3384798"/>
+          </a:xfrm>
+        </p:spPr>
+        <p:txBody>
+          <a:bodyPr/>
+          <a:lstStyle/>
+          <a:p>
+            <a:pPr>
+              <a:buFont typeface="Arial" panose="020B0604020202020204" pitchFamily="34" charset="0"/>
+              <a:buChar char="•"/>
+            </a:pPr>
+            <a:r>
+              <a:rPr lang="de-DE" dirty="0" err="1"/>
+              <a:t>docker</a:t>
+            </a:r>
+            <a:r>
+              <a:rPr lang="de-DE" dirty="0"/>
+              <a:t> </a:t>
+            </a:r>
+            <a:r>
+              <a:rPr lang="de-DE" dirty="0" err="1"/>
+              <a:t>build</a:t>
+            </a:r>
+            <a:r>
+              <a:rPr lang="de-DE" dirty="0"/>
+              <a:t>: Befehl für Bauen von Images</a:t>
+            </a:r>
+          </a:p>
+          <a:p>
+            <a:pPr>
+              <a:buFont typeface="Arial" panose="020B0604020202020204" pitchFamily="34" charset="0"/>
+              <a:buChar char="•"/>
+            </a:pPr>
+            <a:r>
+              <a:rPr lang="de-DE" dirty="0"/>
+              <a:t>-t </a:t>
+            </a:r>
+            <a:r>
+              <a:rPr lang="de-DE" dirty="0" err="1"/>
+              <a:t>example</a:t>
+            </a:r>
+            <a:r>
+              <a:rPr lang="de-DE" dirty="0"/>
+              <a:t>: Gibt dem erstellten Image einen Tag</a:t>
+            </a:r>
+          </a:p>
+          <a:p>
+            <a:pPr>
+              <a:buFont typeface="Arial" panose="020B0604020202020204" pitchFamily="34" charset="0"/>
+              <a:buChar char="•"/>
+            </a:pPr>
+            <a:r>
+              <a:rPr lang="de-DE" dirty="0"/>
+              <a:t>Verzeichnis aus dem das Image erstellt wird</a:t>
+            </a:r>
+          </a:p>
+          <a:p>
+            <a:pPr>
+              <a:buFont typeface="Arial" panose="020B0604020202020204" pitchFamily="34" charset="0"/>
+              <a:buChar char="•"/>
+            </a:pPr>
+            <a:r>
+              <a:rPr lang="de-DE" dirty="0" err="1"/>
+              <a:t>Dockerfile</a:t>
+            </a:r>
+            <a:r>
+              <a:rPr lang="de-DE" dirty="0"/>
+              <a:t> </a:t>
+            </a:r>
+            <a:r>
+              <a:rPr lang="de-DE" dirty="0" err="1"/>
+              <a:t>names</a:t>
+            </a:r>
+            <a:r>
+              <a:rPr lang="de-DE" dirty="0"/>
+              <a:t> „</a:t>
+            </a:r>
+            <a:r>
+              <a:rPr lang="de-DE" dirty="0" err="1"/>
+              <a:t>Dockerfile</a:t>
+            </a:r>
+            <a:r>
+              <a:rPr lang="de-DE" dirty="0"/>
+              <a:t>“ im Verzeichnis</a:t>
+            </a:r>
+          </a:p>
+        </p:txBody>
+      </p:sp>
+      <p:sp>
+        <p:nvSpPr>
+          <p:cNvPr id="4" name="Textfeld 3">
+            <a:extLst>
+              <a:ext uri="{FF2B5EF4-FFF2-40B4-BE49-F238E27FC236}">
+                <a16:creationId xmlns:a16="http://schemas.microsoft.com/office/drawing/2014/main" id="{575FEA88-C68F-924B-C800-0C8D6BD744B1}"/>
+              </a:ext>
+            </a:extLst>
+          </p:cNvPr>
+          <p:cNvSpPr txBox="1"/>
+          <p:nvPr/>
+        </p:nvSpPr>
+        <p:spPr bwMode="auto">
+          <a:xfrm>
+            <a:off x="285720" y="1264406"/>
+            <a:ext cx="8516937" cy="584775"/>
+          </a:xfrm>
+          <a:prstGeom prst="rect">
+            <a:avLst/>
+          </a:prstGeom>
+          <a:noFill/>
+          <a:ln w="9525">
+            <a:noFill/>
+            <a:miter lim="800000"/>
+            <a:headEnd/>
+            <a:tailEnd/>
+          </a:ln>
+        </p:spPr>
+        <p:txBody>
+          <a:bodyPr wrap="square" rtlCol="0" anchor="ctr">
+            <a:spAutoFit/>
+          </a:bodyPr>
+          <a:lstStyle/>
+          <a:p>
+            <a:pPr algn="ctr" eaLnBrk="1" hangingPunct="1"/>
+            <a:r>
+              <a:rPr lang="de-DE" sz="3200" dirty="0">
+                <a:latin typeface="+mj-lt"/>
+              </a:rPr>
+              <a:t>Erstellen von Images</a:t>
+            </a:r>
+          </a:p>
+        </p:txBody>
+      </p:sp>
+      <p:sp>
+        <p:nvSpPr>
+          <p:cNvPr id="5" name="Textfeld 4">
+            <a:extLst>
+              <a:ext uri="{FF2B5EF4-FFF2-40B4-BE49-F238E27FC236}">
+                <a16:creationId xmlns:a16="http://schemas.microsoft.com/office/drawing/2014/main" id="{AA8B9AE6-EF63-25CA-4D6B-117E7B727411}"/>
+              </a:ext>
+            </a:extLst>
+          </p:cNvPr>
+          <p:cNvSpPr txBox="1"/>
+          <p:nvPr/>
+        </p:nvSpPr>
+        <p:spPr bwMode="auto">
+          <a:xfrm>
+            <a:off x="297818" y="2192234"/>
+            <a:ext cx="8516937" cy="461665"/>
+          </a:xfrm>
+          <a:prstGeom prst="rect">
+            <a:avLst/>
+          </a:prstGeom>
+          <a:solidFill>
+            <a:schemeClr val="bg1">
+              <a:lumMod val="85000"/>
+            </a:schemeClr>
+          </a:solidFill>
+          <a:ln w="9525">
+            <a:noFill/>
+            <a:miter lim="800000"/>
+            <a:headEnd/>
+            <a:tailEnd/>
+          </a:ln>
+          <a:effectLst>
+            <a:softEdge rad="25400"/>
+          </a:effectLst>
+        </p:spPr>
+        <p:txBody>
+          <a:bodyPr wrap="square" rtlCol="0" anchor="ctr">
+            <a:spAutoFit/>
+          </a:bodyPr>
+          <a:lstStyle/>
+          <a:p>
+            <a:pPr algn="ctr" eaLnBrk="1" hangingPunct="1"/>
+            <a:r>
+              <a:rPr lang="de-DE" dirty="0" err="1">
+                <a:latin typeface="Arial" charset="0"/>
+              </a:rPr>
+              <a:t>docker</a:t>
+            </a:r>
+            <a:r>
+              <a:rPr lang="de-DE" dirty="0">
+                <a:latin typeface="Arial" charset="0"/>
+              </a:rPr>
+              <a:t> </a:t>
+            </a:r>
+            <a:r>
+              <a:rPr lang="de-DE" dirty="0" err="1">
+                <a:latin typeface="Arial" charset="0"/>
+              </a:rPr>
+              <a:t>build</a:t>
+            </a:r>
+            <a:r>
+              <a:rPr lang="de-DE" dirty="0">
+                <a:latin typeface="Arial" charset="0"/>
+              </a:rPr>
+              <a:t> -t </a:t>
+            </a:r>
+            <a:r>
+              <a:rPr lang="de-DE" dirty="0" err="1">
+                <a:latin typeface="Arial" charset="0"/>
+              </a:rPr>
+              <a:t>example</a:t>
+            </a:r>
+            <a:r>
+              <a:rPr lang="de-DE" dirty="0">
+                <a:latin typeface="Arial" charset="0"/>
+              </a:rPr>
+              <a:t> .</a:t>
+            </a:r>
+          </a:p>
+        </p:txBody>
+      </p:sp>
+    </p:spTree>
+    <p:extLst>
+      <p:ext uri="{BB962C8B-B14F-4D97-AF65-F5344CB8AC3E}">
+        <p14:creationId xmlns:p14="http://schemas.microsoft.com/office/powerpoint/2010/main" val="1459689168"/>
+      </p:ext>
+    </p:extLst>
+  </p:cSld>
+  <p:clrMapOvr>
+    <a:masterClrMapping/>
+  </p:clrMapOvr>
+</p:sld>
+</file>
+
+<file path=ppt/slides/slide11.xml><?xml version="1.0" encoding="utf-8"?>
+<p:sld xmlns:a="http://schemas.openxmlformats.org/drawingml/2006/main" xmlns:r="http://schemas.openxmlformats.org/officeDocument/2006/relationships" xmlns:p="http://schemas.openxmlformats.org/presentationml/2006/main">
+  <p:cSld>
+    <p:spTree>
+      <p:nvGrpSpPr>
+        <p:cNvPr id="1" name=""/>
+        <p:cNvGrpSpPr/>
+        <p:nvPr/>
+      </p:nvGrpSpPr>
+      <p:grpSpPr>
+        <a:xfrm>
+          <a:off x="0" y="0"/>
+          <a:ext cx="0" cy="0"/>
+          <a:chOff x="0" y="0"/>
+          <a:chExt cx="0" cy="0"/>
+        </a:xfrm>
+      </p:grpSpPr>
+      <p:sp>
+        <p:nvSpPr>
+          <p:cNvPr id="2" name="Titel 1">
+            <a:extLst>
+              <a:ext uri="{FF2B5EF4-FFF2-40B4-BE49-F238E27FC236}">
+                <a16:creationId xmlns:a16="http://schemas.microsoft.com/office/drawing/2014/main" id="{95863F39-AC6F-C91A-BC48-29EE6581525D}"/>
+              </a:ext>
+            </a:extLst>
+          </p:cNvPr>
+          <p:cNvSpPr>
+            <a:spLocks noGrp="1"/>
+          </p:cNvSpPr>
+          <p:nvPr>
+            <p:ph type="title"/>
+          </p:nvPr>
+        </p:nvSpPr>
+        <p:spPr/>
+        <p:txBody>
+          <a:bodyPr/>
+          <a:lstStyle/>
+          <a:p>
+            <a:r>
+              <a:rPr lang="de-DE" altLang="de-DE" dirty="0"/>
+              <a:t>Lokale Entwicklung mit Docker</a:t>
+            </a:r>
+            <a:endParaRPr lang="de-DE" dirty="0"/>
+          </a:p>
+        </p:txBody>
+      </p:sp>
+      <p:sp>
+        <p:nvSpPr>
+          <p:cNvPr id="3" name="Inhaltsplatzhalter 2">
+            <a:extLst>
+              <a:ext uri="{FF2B5EF4-FFF2-40B4-BE49-F238E27FC236}">
+                <a16:creationId xmlns:a16="http://schemas.microsoft.com/office/drawing/2014/main" id="{3ED41AEE-F238-EA07-C91E-34B4C1C3FDC0}"/>
+              </a:ext>
+            </a:extLst>
+          </p:cNvPr>
+          <p:cNvSpPr>
+            <a:spLocks noGrp="1"/>
+          </p:cNvSpPr>
+          <p:nvPr>
+            <p:ph idx="1"/>
+          </p:nvPr>
+        </p:nvSpPr>
+        <p:spPr>
+          <a:xfrm>
+            <a:off x="303213" y="3429000"/>
+            <a:ext cx="8516937" cy="2952750"/>
+          </a:xfrm>
+        </p:spPr>
+        <p:txBody>
+          <a:bodyPr/>
+          <a:lstStyle/>
+          <a:p>
+            <a:pPr>
+              <a:buFont typeface="Arial" panose="020B0604020202020204" pitchFamily="34" charset="0"/>
+              <a:buChar char="•"/>
+            </a:pPr>
+            <a:r>
+              <a:rPr lang="de-DE" dirty="0" err="1"/>
+              <a:t>docker</a:t>
+            </a:r>
+            <a:r>
+              <a:rPr lang="de-DE" dirty="0"/>
+              <a:t> erstellt und startet einen Container</a:t>
+            </a:r>
+          </a:p>
+          <a:p>
+            <a:pPr>
+              <a:buFont typeface="Arial" panose="020B0604020202020204" pitchFamily="34" charset="0"/>
+              <a:buChar char="•"/>
+            </a:pPr>
+            <a:r>
+              <a:rPr lang="de-DE" dirty="0"/>
+              <a:t>mit --name können Container benannt werden</a:t>
+            </a:r>
+          </a:p>
+          <a:p>
+            <a:pPr>
+              <a:buFont typeface="Arial" panose="020B0604020202020204" pitchFamily="34" charset="0"/>
+              <a:buChar char="•"/>
+            </a:pPr>
+            <a:r>
+              <a:rPr lang="de-DE" dirty="0"/>
+              <a:t>Viele weitere Optionen je nach Image und Applikation</a:t>
+            </a:r>
+          </a:p>
+          <a:p>
+            <a:pPr>
+              <a:buFont typeface="Arial" panose="020B0604020202020204" pitchFamily="34" charset="0"/>
+              <a:buChar char="•"/>
+            </a:pPr>
+            <a:r>
+              <a:rPr lang="de-DE" dirty="0"/>
+              <a:t>Container haben Namen und ID zur Identifikation</a:t>
+            </a:r>
+          </a:p>
+        </p:txBody>
+      </p:sp>
+      <p:sp>
+        <p:nvSpPr>
+          <p:cNvPr id="5" name="Textfeld 4">
+            <a:extLst>
+              <a:ext uri="{FF2B5EF4-FFF2-40B4-BE49-F238E27FC236}">
+                <a16:creationId xmlns:a16="http://schemas.microsoft.com/office/drawing/2014/main" id="{02FEDFB1-88E0-0AE1-5A10-FF6902E93AA4}"/>
+              </a:ext>
+            </a:extLst>
+          </p:cNvPr>
+          <p:cNvSpPr txBox="1"/>
+          <p:nvPr/>
+        </p:nvSpPr>
+        <p:spPr bwMode="auto">
+          <a:xfrm>
+            <a:off x="285720" y="1264406"/>
+            <a:ext cx="8516937" cy="584775"/>
+          </a:xfrm>
+          <a:prstGeom prst="rect">
+            <a:avLst/>
+          </a:prstGeom>
+          <a:noFill/>
+          <a:ln w="9525">
+            <a:noFill/>
+            <a:miter lim="800000"/>
+            <a:headEnd/>
+            <a:tailEnd/>
+          </a:ln>
+        </p:spPr>
+        <p:txBody>
+          <a:bodyPr wrap="square" rtlCol="0" anchor="ctr">
+            <a:spAutoFit/>
+          </a:bodyPr>
+          <a:lstStyle/>
+          <a:p>
+            <a:pPr algn="ctr" eaLnBrk="1" hangingPunct="1"/>
+            <a:r>
+              <a:rPr lang="de-DE" sz="3200" dirty="0">
+                <a:latin typeface="+mj-lt"/>
+              </a:rPr>
+              <a:t>Erstellen von Containern</a:t>
+            </a:r>
+          </a:p>
+        </p:txBody>
+      </p:sp>
+      <p:sp>
+        <p:nvSpPr>
+          <p:cNvPr id="6" name="Textfeld 5">
+            <a:extLst>
+              <a:ext uri="{FF2B5EF4-FFF2-40B4-BE49-F238E27FC236}">
+                <a16:creationId xmlns:a16="http://schemas.microsoft.com/office/drawing/2014/main" id="{4ACC5388-79C6-75D2-C169-4274E8C247EA}"/>
+              </a:ext>
+            </a:extLst>
+          </p:cNvPr>
+          <p:cNvSpPr txBox="1"/>
+          <p:nvPr/>
+        </p:nvSpPr>
+        <p:spPr bwMode="auto">
+          <a:xfrm>
+            <a:off x="297818" y="2007568"/>
+            <a:ext cx="8516937" cy="830997"/>
+          </a:xfrm>
+          <a:prstGeom prst="rect">
+            <a:avLst/>
+          </a:prstGeom>
+          <a:solidFill>
+            <a:schemeClr val="bg1">
+              <a:lumMod val="85000"/>
+            </a:schemeClr>
+          </a:solidFill>
+          <a:ln w="9525">
+            <a:noFill/>
+            <a:miter lim="800000"/>
+            <a:headEnd/>
+            <a:tailEnd/>
+          </a:ln>
+          <a:effectLst>
+            <a:softEdge rad="25400"/>
+          </a:effectLst>
+        </p:spPr>
+        <p:txBody>
+          <a:bodyPr wrap="square" rtlCol="0" anchor="ctr">
+            <a:spAutoFit/>
+          </a:bodyPr>
+          <a:lstStyle/>
+          <a:p>
+            <a:pPr algn="ctr" eaLnBrk="1" hangingPunct="1"/>
+            <a:r>
+              <a:rPr lang="de-DE" dirty="0" err="1">
+                <a:latin typeface="Arial" charset="0"/>
+              </a:rPr>
+              <a:t>docker</a:t>
+            </a:r>
+            <a:r>
+              <a:rPr lang="de-DE" dirty="0">
+                <a:latin typeface="Arial" charset="0"/>
+              </a:rPr>
+              <a:t> </a:t>
+            </a:r>
+            <a:r>
+              <a:rPr lang="de-DE" dirty="0" err="1">
+                <a:latin typeface="Arial" charset="0"/>
+              </a:rPr>
+              <a:t>run</a:t>
+            </a:r>
+            <a:r>
+              <a:rPr lang="de-DE" dirty="0">
+                <a:latin typeface="Arial" charset="0"/>
+              </a:rPr>
+              <a:t> </a:t>
+            </a:r>
+            <a:r>
+              <a:rPr lang="de-DE" dirty="0" err="1">
+                <a:latin typeface="Arial" charset="0"/>
+              </a:rPr>
+              <a:t>example</a:t>
+            </a:r>
+            <a:endParaRPr lang="de-DE" dirty="0">
+              <a:latin typeface="Arial" charset="0"/>
+            </a:endParaRPr>
+          </a:p>
+          <a:p>
+            <a:pPr algn="ctr" eaLnBrk="1" hangingPunct="1"/>
+            <a:r>
+              <a:rPr lang="de-DE" dirty="0" err="1">
+                <a:latin typeface="Arial" charset="0"/>
+              </a:rPr>
+              <a:t>docker</a:t>
+            </a:r>
+            <a:r>
+              <a:rPr lang="de-DE" dirty="0">
+                <a:latin typeface="Arial" charset="0"/>
+              </a:rPr>
+              <a:t> </a:t>
+            </a:r>
+            <a:r>
+              <a:rPr lang="de-DE" dirty="0" err="1">
+                <a:latin typeface="Arial" charset="0"/>
+              </a:rPr>
+              <a:t>create</a:t>
+            </a:r>
+            <a:r>
+              <a:rPr lang="de-DE" dirty="0">
+                <a:latin typeface="Arial" charset="0"/>
+              </a:rPr>
+              <a:t> </a:t>
+            </a:r>
+            <a:r>
+              <a:rPr lang="de-DE" dirty="0" err="1">
+                <a:latin typeface="Arial" charset="0"/>
+              </a:rPr>
+              <a:t>example</a:t>
+            </a:r>
+            <a:endParaRPr lang="de-DE" dirty="0">
+              <a:latin typeface="Arial" charset="0"/>
+            </a:endParaRPr>
+          </a:p>
+        </p:txBody>
+      </p:sp>
+    </p:spTree>
+    <p:extLst>
+      <p:ext uri="{BB962C8B-B14F-4D97-AF65-F5344CB8AC3E}">
+        <p14:creationId xmlns:p14="http://schemas.microsoft.com/office/powerpoint/2010/main" val="4065056465"/>
+      </p:ext>
+    </p:extLst>
+  </p:cSld>
+  <p:clrMapOvr>
+    <a:masterClrMapping/>
+  </p:clrMapOvr>
+</p:sld>
+</file>
+
+<file path=ppt/slides/slide12.xml><?xml version="1.0" encoding="utf-8"?>
+<p:sld xmlns:a="http://schemas.openxmlformats.org/drawingml/2006/main" xmlns:r="http://schemas.openxmlformats.org/officeDocument/2006/relationships" xmlns:p="http://schemas.openxmlformats.org/presentationml/2006/main">
+  <p:cSld>
+    <p:spTree>
+      <p:nvGrpSpPr>
+        <p:cNvPr id="1" name=""/>
+        <p:cNvGrpSpPr/>
+        <p:nvPr/>
+      </p:nvGrpSpPr>
+      <p:grpSpPr>
+        <a:xfrm>
+          <a:off x="0" y="0"/>
+          <a:ext cx="0" cy="0"/>
+          <a:chOff x="0" y="0"/>
+          <a:chExt cx="0" cy="0"/>
+        </a:xfrm>
+      </p:grpSpPr>
+      <p:sp>
+        <p:nvSpPr>
+          <p:cNvPr id="2" name="Titel 1">
+            <a:extLst>
+              <a:ext uri="{FF2B5EF4-FFF2-40B4-BE49-F238E27FC236}">
                 <a16:creationId xmlns:a16="http://schemas.microsoft.com/office/drawing/2014/main" id="{B9A09C3C-9D10-D2B7-9829-FC04CB2C8A52}"/>
               </a:ext>
             </a:extLst>
@@ -5397,7 +5979,7 @@
 </p:sld>
 </file>
 
-<file path=ppt/slides/slide11.xml><?xml version="1.0" encoding="utf-8"?>
+<file path=ppt/slides/slide13.xml><?xml version="1.0" encoding="utf-8"?>
 <p:sld xmlns:a="http://schemas.openxmlformats.org/drawingml/2006/main" xmlns:r="http://schemas.openxmlformats.org/officeDocument/2006/relationships" xmlns:p="http://schemas.openxmlformats.org/presentationml/2006/main">
   <p:cSld>
     <p:spTree>
@@ -5615,7 +6197,7 @@
 </p:sld>
 </file>
 
-<file path=ppt/slides/slide12.xml><?xml version="1.0" encoding="utf-8"?>
+<file path=ppt/slides/slide14.xml><?xml version="1.0" encoding="utf-8"?>
 <p:sld xmlns:a="http://schemas.openxmlformats.org/drawingml/2006/main" xmlns:r="http://schemas.openxmlformats.org/officeDocument/2006/relationships" xmlns:p="http://schemas.openxmlformats.org/presentationml/2006/main">
   <p:cSld>
     <p:spTree>
@@ -6684,7 +7266,7 @@
 </p:sld>
 </file>
 
-<file path=ppt/slides/slide13.xml><?xml version="1.0" encoding="utf-8"?>
+<file path=ppt/slides/slide15.xml><?xml version="1.0" encoding="utf-8"?>
 <p:sld xmlns:a="http://schemas.openxmlformats.org/drawingml/2006/main" xmlns:r="http://schemas.openxmlformats.org/officeDocument/2006/relationships" xmlns:p="http://schemas.openxmlformats.org/presentationml/2006/main">
   <p:cSld>
     <p:spTree>
@@ -7168,7 +7750,238 @@
 </p:sld>
 </file>
 
-<file path=ppt/slides/slide14.xml><?xml version="1.0" encoding="utf-8"?>
+<file path=ppt/slides/slide16.xml><?xml version="1.0" encoding="utf-8"?>
+<p:sld xmlns:a="http://schemas.openxmlformats.org/drawingml/2006/main" xmlns:r="http://schemas.openxmlformats.org/officeDocument/2006/relationships" xmlns:p="http://schemas.openxmlformats.org/presentationml/2006/main">
+  <p:cSld>
+    <p:spTree>
+      <p:nvGrpSpPr>
+        <p:cNvPr id="1" name=""/>
+        <p:cNvGrpSpPr/>
+        <p:nvPr/>
+      </p:nvGrpSpPr>
+      <p:grpSpPr>
+        <a:xfrm>
+          <a:off x="0" y="0"/>
+          <a:ext cx="0" cy="0"/>
+          <a:chOff x="0" y="0"/>
+          <a:chExt cx="0" cy="0"/>
+        </a:xfrm>
+      </p:grpSpPr>
+      <p:sp>
+        <p:nvSpPr>
+          <p:cNvPr id="2" name="Titel 1">
+            <a:extLst>
+              <a:ext uri="{FF2B5EF4-FFF2-40B4-BE49-F238E27FC236}">
+                <a16:creationId xmlns:a16="http://schemas.microsoft.com/office/drawing/2014/main" id="{AC75C9C8-8382-A31D-5C3E-A1CDFB5E41D7}"/>
+              </a:ext>
+            </a:extLst>
+          </p:cNvPr>
+          <p:cNvSpPr>
+            <a:spLocks noGrp="1"/>
+          </p:cNvSpPr>
+          <p:nvPr>
+            <p:ph type="title"/>
+          </p:nvPr>
+        </p:nvSpPr>
+        <p:spPr/>
+        <p:txBody>
+          <a:bodyPr/>
+          <a:lstStyle/>
+          <a:p>
+            <a:r>
+              <a:rPr lang="de-DE" altLang="de-DE" dirty="0"/>
+              <a:t>Lokale Entwicklung mit Docker</a:t>
+            </a:r>
+            <a:endParaRPr lang="de-DE" dirty="0"/>
+          </a:p>
+        </p:txBody>
+      </p:sp>
+      <p:sp>
+        <p:nvSpPr>
+          <p:cNvPr id="3" name="Inhaltsplatzhalter 2">
+            <a:extLst>
+              <a:ext uri="{FF2B5EF4-FFF2-40B4-BE49-F238E27FC236}">
+                <a16:creationId xmlns:a16="http://schemas.microsoft.com/office/drawing/2014/main" id="{8F4EA8DE-16A8-DA66-9515-67185370CD98}"/>
+              </a:ext>
+            </a:extLst>
+          </p:cNvPr>
+          <p:cNvSpPr>
+            <a:spLocks noGrp="1"/>
+          </p:cNvSpPr>
+          <p:nvPr>
+            <p:ph idx="1"/>
+          </p:nvPr>
+        </p:nvSpPr>
+        <p:spPr>
+          <a:xfrm>
+            <a:off x="303213" y="1916832"/>
+            <a:ext cx="8516937" cy="3744416"/>
+          </a:xfrm>
+        </p:spPr>
+        <p:txBody>
+          <a:bodyPr/>
+          <a:lstStyle/>
+          <a:p>
+            <a:pPr>
+              <a:buFont typeface="Arial" panose="020B0604020202020204" pitchFamily="34" charset="0"/>
+              <a:buChar char="•"/>
+            </a:pPr>
+            <a:r>
+              <a:rPr lang="de-DE" dirty="0"/>
+              <a:t>Schritte einer Pipeline in Containern ausführen</a:t>
+            </a:r>
+          </a:p>
+          <a:p>
+            <a:pPr>
+              <a:buFont typeface="Arial" panose="020B0604020202020204" pitchFamily="34" charset="0"/>
+              <a:buChar char="•"/>
+            </a:pPr>
+            <a:r>
+              <a:rPr lang="de-DE" dirty="0"/>
+              <a:t>Zuverlässig</a:t>
+            </a:r>
+          </a:p>
+          <a:p>
+            <a:pPr>
+              <a:buFont typeface="Arial" panose="020B0604020202020204" pitchFamily="34" charset="0"/>
+              <a:buChar char="•"/>
+            </a:pPr>
+            <a:r>
+              <a:rPr lang="de-DE" dirty="0"/>
+              <a:t>Ein Container pro Stage</a:t>
+            </a:r>
+          </a:p>
+          <a:p>
+            <a:pPr>
+              <a:buFont typeface="Arial" panose="020B0604020202020204" pitchFamily="34" charset="0"/>
+              <a:buChar char="•"/>
+            </a:pPr>
+            <a:r>
+              <a:rPr lang="de-DE" dirty="0"/>
+              <a:t>Verschiedene Umgebungen</a:t>
+            </a:r>
+          </a:p>
+          <a:p>
+            <a:pPr>
+              <a:buFont typeface="Arial" panose="020B0604020202020204" pitchFamily="34" charset="0"/>
+              <a:buChar char="•"/>
+            </a:pPr>
+            <a:r>
+              <a:rPr lang="de-DE" dirty="0"/>
+              <a:t>Abgekapselt</a:t>
+            </a:r>
+          </a:p>
+        </p:txBody>
+      </p:sp>
+      <p:sp>
+        <p:nvSpPr>
+          <p:cNvPr id="4" name="Textfeld 3">
+            <a:extLst>
+              <a:ext uri="{FF2B5EF4-FFF2-40B4-BE49-F238E27FC236}">
+                <a16:creationId xmlns:a16="http://schemas.microsoft.com/office/drawing/2014/main" id="{6D05E526-4370-4B74-4737-5D60274AF541}"/>
+              </a:ext>
+            </a:extLst>
+          </p:cNvPr>
+          <p:cNvSpPr txBox="1"/>
+          <p:nvPr/>
+        </p:nvSpPr>
+        <p:spPr bwMode="auto">
+          <a:xfrm>
+            <a:off x="285720" y="1196752"/>
+            <a:ext cx="8516937" cy="584775"/>
+          </a:xfrm>
+          <a:prstGeom prst="rect">
+            <a:avLst/>
+          </a:prstGeom>
+          <a:noFill/>
+          <a:ln w="9525">
+            <a:noFill/>
+            <a:miter lim="800000"/>
+            <a:headEnd/>
+            <a:tailEnd/>
+          </a:ln>
+        </p:spPr>
+        <p:txBody>
+          <a:bodyPr wrap="square" rtlCol="0" anchor="ctr">
+            <a:spAutoFit/>
+          </a:bodyPr>
+          <a:lstStyle/>
+          <a:p>
+            <a:pPr algn="ctr" eaLnBrk="1" hangingPunct="1"/>
+            <a:r>
+              <a:rPr lang="de-DE" sz="3200" dirty="0">
+                <a:latin typeface="+mj-lt"/>
+              </a:rPr>
+              <a:t>Integration mit </a:t>
+            </a:r>
+            <a:r>
+              <a:rPr lang="de-DE" sz="3200" dirty="0" err="1">
+                <a:latin typeface="+mj-lt"/>
+              </a:rPr>
+              <a:t>Gitlabs</a:t>
+            </a:r>
+            <a:r>
+              <a:rPr lang="de-DE" sz="3200" dirty="0">
+                <a:latin typeface="+mj-lt"/>
+              </a:rPr>
+              <a:t>-CI</a:t>
+            </a:r>
+          </a:p>
+        </p:txBody>
+      </p:sp>
+      <p:pic>
+        <p:nvPicPr>
+          <p:cNvPr id="6" name="Grafik 5" descr="Ein Bild, das Text, Schrift, Screenshot, Design enthält.&#10;&#10;Automatisch generierte Beschreibung">
+            <a:extLst>
+              <a:ext uri="{FF2B5EF4-FFF2-40B4-BE49-F238E27FC236}">
+                <a16:creationId xmlns:a16="http://schemas.microsoft.com/office/drawing/2014/main" id="{D71E69EE-B2A2-3342-5B33-68225B5CCAB9}"/>
+              </a:ext>
+            </a:extLst>
+          </p:cNvPr>
+          <p:cNvPicPr>
+            <a:picLocks noChangeAspect="1"/>
+          </p:cNvPicPr>
+          <p:nvPr/>
+        </p:nvPicPr>
+        <p:blipFill>
+          <a:blip r:embed="rId2">
+            <a:extLst>
+              <a:ext uri="{28A0092B-C50C-407E-A947-70E740481C1C}">
+                <a14:useLocalDpi xmlns:a14="http://schemas.microsoft.com/office/drawing/2010/main" val="0"/>
+              </a:ext>
+            </a:extLst>
+          </a:blip>
+          <a:stretch>
+            <a:fillRect/>
+          </a:stretch>
+        </p:blipFill>
+        <p:spPr>
+          <a:xfrm>
+            <a:off x="5840383" y="2798961"/>
+            <a:ext cx="2718489" cy="3127048"/>
+          </a:xfrm>
+          <a:prstGeom prst="rect">
+            <a:avLst/>
+          </a:prstGeom>
+          <a:effectLst>
+            <a:softEdge rad="50800"/>
+          </a:effectLst>
+        </p:spPr>
+      </p:pic>
+    </p:spTree>
+    <p:extLst>
+      <p:ext uri="{BB962C8B-B14F-4D97-AF65-F5344CB8AC3E}">
+        <p14:creationId xmlns:p14="http://schemas.microsoft.com/office/powerpoint/2010/main" val="3524195620"/>
+      </p:ext>
+    </p:extLst>
+  </p:cSld>
+  <p:clrMapOvr>
+    <a:masterClrMapping/>
+  </p:clrMapOvr>
+</p:sld>
+</file>
+
+<file path=ppt/slides/slide17.xml><?xml version="1.0" encoding="utf-8"?>
 <p:sld xmlns:a="http://schemas.openxmlformats.org/drawingml/2006/main" xmlns:r="http://schemas.openxmlformats.org/officeDocument/2006/relationships" xmlns:p="http://schemas.openxmlformats.org/presentationml/2006/main">
   <p:cSld>
     <p:spTree>
@@ -7804,6 +8617,323 @@
 </file>
 
 <file path=ppt/slides/slide4.xml><?xml version="1.0" encoding="utf-8"?>
+<p:sld xmlns:a="http://schemas.openxmlformats.org/drawingml/2006/main" xmlns:r="http://schemas.openxmlformats.org/officeDocument/2006/relationships" xmlns:p="http://schemas.openxmlformats.org/presentationml/2006/main">
+  <p:cSld>
+    <p:spTree>
+      <p:nvGrpSpPr>
+        <p:cNvPr id="1" name=""/>
+        <p:cNvGrpSpPr/>
+        <p:nvPr/>
+      </p:nvGrpSpPr>
+      <p:grpSpPr>
+        <a:xfrm>
+          <a:off x="0" y="0"/>
+          <a:ext cx="0" cy="0"/>
+          <a:chOff x="0" y="0"/>
+          <a:chExt cx="0" cy="0"/>
+        </a:xfrm>
+      </p:grpSpPr>
+      <p:sp>
+        <p:nvSpPr>
+          <p:cNvPr id="2" name="Titel 1">
+            <a:extLst>
+              <a:ext uri="{FF2B5EF4-FFF2-40B4-BE49-F238E27FC236}">
+                <a16:creationId xmlns:a16="http://schemas.microsoft.com/office/drawing/2014/main" id="{26FFBC5D-31BA-6F29-1307-97E4E666E11D}"/>
+              </a:ext>
+            </a:extLst>
+          </p:cNvPr>
+          <p:cNvSpPr>
+            <a:spLocks noGrp="1"/>
+          </p:cNvSpPr>
+          <p:nvPr>
+            <p:ph type="title"/>
+          </p:nvPr>
+        </p:nvSpPr>
+        <p:spPr/>
+        <p:txBody>
+          <a:bodyPr/>
+          <a:lstStyle/>
+          <a:p>
+            <a:r>
+              <a:rPr lang="de-DE" altLang="de-DE" dirty="0"/>
+              <a:t>Lokale Entwicklung mit Docker</a:t>
+            </a:r>
+            <a:endParaRPr lang="de-DE" dirty="0"/>
+          </a:p>
+        </p:txBody>
+      </p:sp>
+      <p:pic>
+        <p:nvPicPr>
+          <p:cNvPr id="6" name="Inhaltsplatzhalter 5" descr="Ein Bild, das Text, Screenshot, Diagramm, parallel enthält.&#10;&#10;Automatisch generierte Beschreibung">
+            <a:extLst>
+              <a:ext uri="{FF2B5EF4-FFF2-40B4-BE49-F238E27FC236}">
+                <a16:creationId xmlns:a16="http://schemas.microsoft.com/office/drawing/2014/main" id="{691D6D46-577F-757D-73CB-39F98A2B11AD}"/>
+              </a:ext>
+            </a:extLst>
+          </p:cNvPr>
+          <p:cNvPicPr>
+            <a:picLocks noGrp="1" noChangeAspect="1"/>
+          </p:cNvPicPr>
+          <p:nvPr>
+            <p:ph idx="1"/>
+          </p:nvPr>
+        </p:nvPicPr>
+        <p:blipFill>
+          <a:blip r:embed="rId2">
+            <a:extLst>
+              <a:ext uri="{28A0092B-C50C-407E-A947-70E740481C1C}">
+                <a14:useLocalDpi xmlns:a14="http://schemas.microsoft.com/office/drawing/2010/main" val="0"/>
+              </a:ext>
+            </a:extLst>
+          </a:blip>
+          <a:stretch>
+            <a:fillRect/>
+          </a:stretch>
+        </p:blipFill>
+        <p:spPr>
+          <a:xfrm>
+            <a:off x="907045" y="2090271"/>
+            <a:ext cx="7329910" cy="3870050"/>
+          </a:xfrm>
+        </p:spPr>
+      </p:pic>
+      <p:sp>
+        <p:nvSpPr>
+          <p:cNvPr id="4" name="Textfeld 3">
+            <a:extLst>
+              <a:ext uri="{FF2B5EF4-FFF2-40B4-BE49-F238E27FC236}">
+                <a16:creationId xmlns:a16="http://schemas.microsoft.com/office/drawing/2014/main" id="{B4323966-8051-9371-9650-27BE4F108771}"/>
+              </a:ext>
+            </a:extLst>
+          </p:cNvPr>
+          <p:cNvSpPr txBox="1"/>
+          <p:nvPr/>
+        </p:nvSpPr>
+        <p:spPr bwMode="auto">
+          <a:xfrm>
+            <a:off x="323528" y="1181364"/>
+            <a:ext cx="8496944" cy="584775"/>
+          </a:xfrm>
+          <a:prstGeom prst="rect">
+            <a:avLst/>
+          </a:prstGeom>
+          <a:noFill/>
+          <a:ln w="9525">
+            <a:noFill/>
+            <a:miter lim="800000"/>
+            <a:headEnd/>
+            <a:tailEnd/>
+          </a:ln>
+        </p:spPr>
+        <p:txBody>
+          <a:bodyPr wrap="square" rtlCol="0" anchor="ctr">
+            <a:spAutoFit/>
+          </a:bodyPr>
+          <a:lstStyle/>
+          <a:p>
+            <a:pPr algn="ctr" eaLnBrk="1" hangingPunct="1"/>
+            <a:r>
+              <a:rPr lang="de-DE" sz="3200" dirty="0">
+                <a:latin typeface="+mj-lt"/>
+              </a:rPr>
+              <a:t>Docker Infrastruktur</a:t>
+            </a:r>
+          </a:p>
+        </p:txBody>
+      </p:sp>
+    </p:spTree>
+    <p:extLst>
+      <p:ext uri="{BB962C8B-B14F-4D97-AF65-F5344CB8AC3E}">
+        <p14:creationId xmlns:p14="http://schemas.microsoft.com/office/powerpoint/2010/main" val="799554079"/>
+      </p:ext>
+    </p:extLst>
+  </p:cSld>
+  <p:clrMapOvr>
+    <a:masterClrMapping/>
+  </p:clrMapOvr>
+</p:sld>
+</file>
+
+<file path=ppt/slides/slide5.xml><?xml version="1.0" encoding="utf-8"?>
+<p:sld xmlns:a="http://schemas.openxmlformats.org/drawingml/2006/main" xmlns:r="http://schemas.openxmlformats.org/officeDocument/2006/relationships" xmlns:p="http://schemas.openxmlformats.org/presentationml/2006/main">
+  <p:cSld>
+    <p:spTree>
+      <p:nvGrpSpPr>
+        <p:cNvPr id="1" name=""/>
+        <p:cNvGrpSpPr/>
+        <p:nvPr/>
+      </p:nvGrpSpPr>
+      <p:grpSpPr>
+        <a:xfrm>
+          <a:off x="0" y="0"/>
+          <a:ext cx="0" cy="0"/>
+          <a:chOff x="0" y="0"/>
+          <a:chExt cx="0" cy="0"/>
+        </a:xfrm>
+      </p:grpSpPr>
+      <p:sp>
+        <p:nvSpPr>
+          <p:cNvPr id="2" name="Titel 1">
+            <a:extLst>
+              <a:ext uri="{FF2B5EF4-FFF2-40B4-BE49-F238E27FC236}">
+                <a16:creationId xmlns:a16="http://schemas.microsoft.com/office/drawing/2014/main" id="{26FFBC5D-31BA-6F29-1307-97E4E666E11D}"/>
+              </a:ext>
+            </a:extLst>
+          </p:cNvPr>
+          <p:cNvSpPr>
+            <a:spLocks noGrp="1"/>
+          </p:cNvSpPr>
+          <p:nvPr>
+            <p:ph type="title"/>
+          </p:nvPr>
+        </p:nvSpPr>
+        <p:spPr/>
+        <p:txBody>
+          <a:bodyPr/>
+          <a:lstStyle/>
+          <a:p>
+            <a:r>
+              <a:rPr lang="de-DE" altLang="de-DE" dirty="0"/>
+              <a:t>Lokale Entwicklung mit Docker</a:t>
+            </a:r>
+            <a:endParaRPr lang="de-DE" dirty="0"/>
+          </a:p>
+        </p:txBody>
+      </p:sp>
+      <p:sp>
+        <p:nvSpPr>
+          <p:cNvPr id="4" name="Textfeld 3">
+            <a:extLst>
+              <a:ext uri="{FF2B5EF4-FFF2-40B4-BE49-F238E27FC236}">
+                <a16:creationId xmlns:a16="http://schemas.microsoft.com/office/drawing/2014/main" id="{B4323966-8051-9371-9650-27BE4F108771}"/>
+              </a:ext>
+            </a:extLst>
+          </p:cNvPr>
+          <p:cNvSpPr txBox="1"/>
+          <p:nvPr/>
+        </p:nvSpPr>
+        <p:spPr bwMode="auto">
+          <a:xfrm>
+            <a:off x="323528" y="1181364"/>
+            <a:ext cx="8496944" cy="584775"/>
+          </a:xfrm>
+          <a:prstGeom prst="rect">
+            <a:avLst/>
+          </a:prstGeom>
+          <a:noFill/>
+          <a:ln w="9525">
+            <a:noFill/>
+            <a:miter lim="800000"/>
+            <a:headEnd/>
+            <a:tailEnd/>
+          </a:ln>
+        </p:spPr>
+        <p:txBody>
+          <a:bodyPr wrap="square" rtlCol="0" anchor="ctr">
+            <a:spAutoFit/>
+          </a:bodyPr>
+          <a:lstStyle/>
+          <a:p>
+            <a:pPr algn="ctr" eaLnBrk="1" hangingPunct="1"/>
+            <a:r>
+              <a:rPr lang="de-DE" sz="3200" dirty="0">
+                <a:latin typeface="+mj-lt"/>
+              </a:rPr>
+              <a:t>Docker Infrastruktur</a:t>
+            </a:r>
+          </a:p>
+        </p:txBody>
+      </p:sp>
+      <p:sp>
+        <p:nvSpPr>
+          <p:cNvPr id="3" name="Inhaltsplatzhalter 2">
+            <a:extLst>
+              <a:ext uri="{FF2B5EF4-FFF2-40B4-BE49-F238E27FC236}">
+                <a16:creationId xmlns:a16="http://schemas.microsoft.com/office/drawing/2014/main" id="{0A977AFF-265E-341B-4B1F-56E1BB023E66}"/>
+              </a:ext>
+            </a:extLst>
+          </p:cNvPr>
+          <p:cNvSpPr>
+            <a:spLocks noGrp="1"/>
+          </p:cNvSpPr>
+          <p:nvPr>
+            <p:ph idx="1"/>
+          </p:nvPr>
+        </p:nvSpPr>
+        <p:spPr>
+          <a:xfrm>
+            <a:off x="303213" y="2090271"/>
+            <a:ext cx="8516937" cy="4291479"/>
+          </a:xfrm>
+        </p:spPr>
+        <p:txBody>
+          <a:bodyPr/>
+          <a:lstStyle/>
+          <a:p>
+            <a:pPr>
+              <a:buFont typeface="Arial" panose="020B0604020202020204" pitchFamily="34" charset="0"/>
+              <a:buChar char="•"/>
+            </a:pPr>
+            <a:r>
+              <a:rPr lang="de-DE" dirty="0"/>
+              <a:t>Docker Client Kommuniziert mit </a:t>
+            </a:r>
+            <a:r>
+              <a:rPr lang="de-DE" dirty="0" err="1"/>
+              <a:t>daemon</a:t>
+            </a:r>
+            <a:r>
+              <a:rPr lang="de-DE" dirty="0"/>
+              <a:t> auf dem Server</a:t>
+            </a:r>
+          </a:p>
+          <a:p>
+            <a:pPr>
+              <a:buFont typeface="Arial" panose="020B0604020202020204" pitchFamily="34" charset="0"/>
+              <a:buChar char="•"/>
+            </a:pPr>
+            <a:r>
+              <a:rPr lang="de-DE" dirty="0" err="1"/>
+              <a:t>Daemon</a:t>
+            </a:r>
+            <a:r>
+              <a:rPr lang="de-DE" dirty="0"/>
+              <a:t> übernimmt die meiste Arbeit</a:t>
+            </a:r>
+          </a:p>
+          <a:p>
+            <a:pPr>
+              <a:buFont typeface="Arial" panose="020B0604020202020204" pitchFamily="34" charset="0"/>
+              <a:buChar char="•"/>
+            </a:pPr>
+            <a:r>
+              <a:rPr lang="de-DE" dirty="0"/>
+              <a:t>Client und Server können auf dem gleichen System sein</a:t>
+            </a:r>
+          </a:p>
+          <a:p>
+            <a:pPr>
+              <a:buFont typeface="Arial" panose="020B0604020202020204" pitchFamily="34" charset="0"/>
+              <a:buChar char="•"/>
+            </a:pPr>
+            <a:endParaRPr lang="de-DE" dirty="0"/>
+          </a:p>
+        </p:txBody>
+      </p:sp>
+    </p:spTree>
+    <p:extLst>
+      <p:ext uri="{BB962C8B-B14F-4D97-AF65-F5344CB8AC3E}">
+        <p14:creationId xmlns:p14="http://schemas.microsoft.com/office/powerpoint/2010/main" val="2429737609"/>
+      </p:ext>
+    </p:extLst>
+  </p:cSld>
+  <p:clrMapOvr>
+    <a:masterClrMapping/>
+  </p:clrMapOvr>
+</p:sld>
+</file>
+
+<file path=ppt/slides/slide6.xml><?xml version="1.0" encoding="utf-8"?>
 <p:sld xmlns:a="http://schemas.openxmlformats.org/drawingml/2006/main" xmlns:r="http://schemas.openxmlformats.org/officeDocument/2006/relationships" xmlns:p="http://schemas.openxmlformats.org/presentationml/2006/main">
   <p:cSld>
     <p:spTree>
@@ -8052,7 +9182,7 @@
 </p:sld>
 </file>
 
-<file path=ppt/slides/slide5.xml><?xml version="1.0" encoding="utf-8"?>
+<file path=ppt/slides/slide7.xml><?xml version="1.0" encoding="utf-8"?>
 <p:sld xmlns:a="http://schemas.openxmlformats.org/drawingml/2006/main" xmlns:r="http://schemas.openxmlformats.org/officeDocument/2006/relationships" xmlns:p="http://schemas.openxmlformats.org/presentationml/2006/main">
   <p:cSld>
     <p:spTree>
@@ -8277,7 +9407,7 @@
 </p:sld>
 </file>
 
-<file path=ppt/slides/slide6.xml><?xml version="1.0" encoding="utf-8"?>
+<file path=ppt/slides/slide8.xml><?xml version="1.0" encoding="utf-8"?>
 <p:sld xmlns:a="http://schemas.openxmlformats.org/drawingml/2006/main" xmlns:r="http://schemas.openxmlformats.org/officeDocument/2006/relationships" xmlns:p="http://schemas.openxmlformats.org/presentationml/2006/main">
   <p:cSld>
     <p:spTree>
@@ -8733,7 +9863,7 @@
 </p:sld>
 </file>
 
-<file path=ppt/slides/slide7.xml><?xml version="1.0" encoding="utf-8"?>
+<file path=ppt/slides/slide9.xml><?xml version="1.0" encoding="utf-8"?>
 <p:sld xmlns:a="http://schemas.openxmlformats.org/drawingml/2006/main" xmlns:r="http://schemas.openxmlformats.org/officeDocument/2006/relationships" xmlns:p="http://schemas.openxmlformats.org/presentationml/2006/main">
   <p:cSld>
     <p:spTree>
@@ -8942,585 +10072,6 @@
     <p:extLst>
       <p:ext uri="{BB962C8B-B14F-4D97-AF65-F5344CB8AC3E}">
         <p14:creationId xmlns:p14="http://schemas.microsoft.com/office/powerpoint/2010/main" val="2209957316"/>
-      </p:ext>
-    </p:extLst>
-  </p:cSld>
-  <p:clrMapOvr>
-    <a:masterClrMapping/>
-  </p:clrMapOvr>
-</p:sld>
-</file>
-
-<file path=ppt/slides/slide8.xml><?xml version="1.0" encoding="utf-8"?>
-<p:sld xmlns:a="http://schemas.openxmlformats.org/drawingml/2006/main" xmlns:r="http://schemas.openxmlformats.org/officeDocument/2006/relationships" xmlns:p="http://schemas.openxmlformats.org/presentationml/2006/main">
-  <p:cSld>
-    <p:spTree>
-      <p:nvGrpSpPr>
-        <p:cNvPr id="1" name=""/>
-        <p:cNvGrpSpPr/>
-        <p:nvPr/>
-      </p:nvGrpSpPr>
-      <p:grpSpPr>
-        <a:xfrm>
-          <a:off x="0" y="0"/>
-          <a:ext cx="0" cy="0"/>
-          <a:chOff x="0" y="0"/>
-          <a:chExt cx="0" cy="0"/>
-        </a:xfrm>
-      </p:grpSpPr>
-      <p:sp>
-        <p:nvSpPr>
-          <p:cNvPr id="2" name="Titel 1">
-            <a:extLst>
-              <a:ext uri="{FF2B5EF4-FFF2-40B4-BE49-F238E27FC236}">
-                <a16:creationId xmlns:a16="http://schemas.microsoft.com/office/drawing/2014/main" id="{850FF3C7-B3ED-0A8B-5D14-2B093646715A}"/>
-              </a:ext>
-            </a:extLst>
-          </p:cNvPr>
-          <p:cNvSpPr>
-            <a:spLocks noGrp="1"/>
-          </p:cNvSpPr>
-          <p:nvPr>
-            <p:ph type="title"/>
-          </p:nvPr>
-        </p:nvSpPr>
-        <p:spPr/>
-        <p:txBody>
-          <a:bodyPr/>
-          <a:lstStyle/>
-          <a:p>
-            <a:r>
-              <a:rPr lang="de-DE" altLang="de-DE" dirty="0"/>
-              <a:t>Lokale Entwicklung mit Docker</a:t>
-            </a:r>
-            <a:endParaRPr lang="de-DE" dirty="0"/>
-          </a:p>
-        </p:txBody>
-      </p:sp>
-      <p:sp>
-        <p:nvSpPr>
-          <p:cNvPr id="3" name="Inhaltsplatzhalter 2">
-            <a:extLst>
-              <a:ext uri="{FF2B5EF4-FFF2-40B4-BE49-F238E27FC236}">
-                <a16:creationId xmlns:a16="http://schemas.microsoft.com/office/drawing/2014/main" id="{0DC67BCE-F3AB-A77C-5BBC-4F0D1EB74590}"/>
-              </a:ext>
-            </a:extLst>
-          </p:cNvPr>
-          <p:cNvSpPr>
-            <a:spLocks noGrp="1"/>
-          </p:cNvSpPr>
-          <p:nvPr>
-            <p:ph idx="1"/>
-          </p:nvPr>
-        </p:nvSpPr>
-        <p:spPr>
-          <a:xfrm>
-            <a:off x="303213" y="2996952"/>
-            <a:ext cx="8516937" cy="3384798"/>
-          </a:xfrm>
-        </p:spPr>
-        <p:txBody>
-          <a:bodyPr/>
-          <a:lstStyle/>
-          <a:p>
-            <a:pPr>
-              <a:buFont typeface="Arial" panose="020B0604020202020204" pitchFamily="34" charset="0"/>
-              <a:buChar char="•"/>
-            </a:pPr>
-            <a:r>
-              <a:rPr lang="de-DE" dirty="0" err="1"/>
-              <a:t>docker</a:t>
-            </a:r>
-            <a:r>
-              <a:rPr lang="de-DE" dirty="0"/>
-              <a:t> </a:t>
-            </a:r>
-            <a:r>
-              <a:rPr lang="de-DE" dirty="0" err="1"/>
-              <a:t>build</a:t>
-            </a:r>
-            <a:r>
-              <a:rPr lang="de-DE" dirty="0"/>
-              <a:t>: Befehl für Bauen von Images</a:t>
-            </a:r>
-          </a:p>
-          <a:p>
-            <a:pPr>
-              <a:buFont typeface="Arial" panose="020B0604020202020204" pitchFamily="34" charset="0"/>
-              <a:buChar char="•"/>
-            </a:pPr>
-            <a:r>
-              <a:rPr lang="de-DE" dirty="0"/>
-              <a:t>-t </a:t>
-            </a:r>
-            <a:r>
-              <a:rPr lang="de-DE" dirty="0" err="1"/>
-              <a:t>example</a:t>
-            </a:r>
-            <a:r>
-              <a:rPr lang="de-DE" dirty="0"/>
-              <a:t>: Gibt dem erstellten Image einen Tag</a:t>
-            </a:r>
-          </a:p>
-          <a:p>
-            <a:pPr>
-              <a:buFont typeface="Arial" panose="020B0604020202020204" pitchFamily="34" charset="0"/>
-              <a:buChar char="•"/>
-            </a:pPr>
-            <a:r>
-              <a:rPr lang="de-DE" dirty="0"/>
-              <a:t>Verzeichnis aus dem das Image erstellt wird</a:t>
-            </a:r>
-          </a:p>
-          <a:p>
-            <a:pPr>
-              <a:buFont typeface="Arial" panose="020B0604020202020204" pitchFamily="34" charset="0"/>
-              <a:buChar char="•"/>
-            </a:pPr>
-            <a:r>
-              <a:rPr lang="de-DE" dirty="0" err="1"/>
-              <a:t>Dockerfile</a:t>
-            </a:r>
-            <a:r>
-              <a:rPr lang="de-DE" dirty="0"/>
-              <a:t> </a:t>
-            </a:r>
-            <a:r>
-              <a:rPr lang="de-DE" dirty="0" err="1"/>
-              <a:t>names</a:t>
-            </a:r>
-            <a:r>
-              <a:rPr lang="de-DE" dirty="0"/>
-              <a:t> „</a:t>
-            </a:r>
-            <a:r>
-              <a:rPr lang="de-DE" dirty="0" err="1"/>
-              <a:t>Dockerfile</a:t>
-            </a:r>
-            <a:r>
-              <a:rPr lang="de-DE" dirty="0"/>
-              <a:t>“ im Verzeichnis</a:t>
-            </a:r>
-          </a:p>
-        </p:txBody>
-      </p:sp>
-      <p:sp>
-        <p:nvSpPr>
-          <p:cNvPr id="4" name="Textfeld 3">
-            <a:extLst>
-              <a:ext uri="{FF2B5EF4-FFF2-40B4-BE49-F238E27FC236}">
-                <a16:creationId xmlns:a16="http://schemas.microsoft.com/office/drawing/2014/main" id="{575FEA88-C68F-924B-C800-0C8D6BD744B1}"/>
-              </a:ext>
-            </a:extLst>
-          </p:cNvPr>
-          <p:cNvSpPr txBox="1"/>
-          <p:nvPr/>
-        </p:nvSpPr>
-        <p:spPr bwMode="auto">
-          <a:xfrm>
-            <a:off x="285720" y="1264406"/>
-            <a:ext cx="8516937" cy="584775"/>
-          </a:xfrm>
-          <a:prstGeom prst="rect">
-            <a:avLst/>
-          </a:prstGeom>
-          <a:noFill/>
-          <a:ln w="9525">
-            <a:noFill/>
-            <a:miter lim="800000"/>
-            <a:headEnd/>
-            <a:tailEnd/>
-          </a:ln>
-        </p:spPr>
-        <p:txBody>
-          <a:bodyPr wrap="square" rtlCol="0" anchor="ctr">
-            <a:spAutoFit/>
-          </a:bodyPr>
-          <a:lstStyle/>
-          <a:p>
-            <a:pPr algn="ctr" eaLnBrk="1" hangingPunct="1"/>
-            <a:r>
-              <a:rPr lang="de-DE" sz="3200" dirty="0">
-                <a:latin typeface="+mj-lt"/>
-              </a:rPr>
-              <a:t>Erstellen von Images</a:t>
-            </a:r>
-          </a:p>
-        </p:txBody>
-      </p:sp>
-      <p:sp>
-        <p:nvSpPr>
-          <p:cNvPr id="5" name="Textfeld 4">
-            <a:extLst>
-              <a:ext uri="{FF2B5EF4-FFF2-40B4-BE49-F238E27FC236}">
-                <a16:creationId xmlns:a16="http://schemas.microsoft.com/office/drawing/2014/main" id="{AA8B9AE6-EF63-25CA-4D6B-117E7B727411}"/>
-              </a:ext>
-            </a:extLst>
-          </p:cNvPr>
-          <p:cNvSpPr txBox="1"/>
-          <p:nvPr/>
-        </p:nvSpPr>
-        <p:spPr bwMode="auto">
-          <a:xfrm>
-            <a:off x="297818" y="2192234"/>
-            <a:ext cx="8516937" cy="461665"/>
-          </a:xfrm>
-          <a:prstGeom prst="rect">
-            <a:avLst/>
-          </a:prstGeom>
-          <a:solidFill>
-            <a:schemeClr val="bg1">
-              <a:lumMod val="85000"/>
-            </a:schemeClr>
-          </a:solidFill>
-          <a:ln w="9525">
-            <a:noFill/>
-            <a:miter lim="800000"/>
-            <a:headEnd/>
-            <a:tailEnd/>
-          </a:ln>
-          <a:effectLst>
-            <a:softEdge rad="25400"/>
-          </a:effectLst>
-        </p:spPr>
-        <p:txBody>
-          <a:bodyPr wrap="square" rtlCol="0" anchor="ctr">
-            <a:spAutoFit/>
-          </a:bodyPr>
-          <a:lstStyle/>
-          <a:p>
-            <a:pPr algn="ctr" eaLnBrk="1" hangingPunct="1"/>
-            <a:r>
-              <a:rPr lang="de-DE" dirty="0" err="1">
-                <a:latin typeface="Arial" charset="0"/>
-              </a:rPr>
-              <a:t>docker</a:t>
-            </a:r>
-            <a:r>
-              <a:rPr lang="de-DE" dirty="0">
-                <a:latin typeface="Arial" charset="0"/>
-              </a:rPr>
-              <a:t> </a:t>
-            </a:r>
-            <a:r>
-              <a:rPr lang="de-DE" dirty="0" err="1">
-                <a:latin typeface="Arial" charset="0"/>
-              </a:rPr>
-              <a:t>build</a:t>
-            </a:r>
-            <a:r>
-              <a:rPr lang="de-DE" dirty="0">
-                <a:latin typeface="Arial" charset="0"/>
-              </a:rPr>
-              <a:t> -t </a:t>
-            </a:r>
-            <a:r>
-              <a:rPr lang="de-DE" dirty="0" err="1">
-                <a:latin typeface="Arial" charset="0"/>
-              </a:rPr>
-              <a:t>example</a:t>
-            </a:r>
-            <a:r>
-              <a:rPr lang="de-DE" dirty="0">
-                <a:latin typeface="Arial" charset="0"/>
-              </a:rPr>
-              <a:t> .</a:t>
-            </a:r>
-          </a:p>
-        </p:txBody>
-      </p:sp>
-    </p:spTree>
-    <p:extLst>
-      <p:ext uri="{BB962C8B-B14F-4D97-AF65-F5344CB8AC3E}">
-        <p14:creationId xmlns:p14="http://schemas.microsoft.com/office/powerpoint/2010/main" val="1459689168"/>
-      </p:ext>
-    </p:extLst>
-  </p:cSld>
-  <p:clrMapOvr>
-    <a:masterClrMapping/>
-  </p:clrMapOvr>
-</p:sld>
-</file>
-
-<file path=ppt/slides/slide9.xml><?xml version="1.0" encoding="utf-8"?>
-<p:sld xmlns:a="http://schemas.openxmlformats.org/drawingml/2006/main" xmlns:r="http://schemas.openxmlformats.org/officeDocument/2006/relationships" xmlns:p="http://schemas.openxmlformats.org/presentationml/2006/main">
-  <p:cSld>
-    <p:spTree>
-      <p:nvGrpSpPr>
-        <p:cNvPr id="1" name=""/>
-        <p:cNvGrpSpPr/>
-        <p:nvPr/>
-      </p:nvGrpSpPr>
-      <p:grpSpPr>
-        <a:xfrm>
-          <a:off x="0" y="0"/>
-          <a:ext cx="0" cy="0"/>
-          <a:chOff x="0" y="0"/>
-          <a:chExt cx="0" cy="0"/>
-        </a:xfrm>
-      </p:grpSpPr>
-      <p:sp>
-        <p:nvSpPr>
-          <p:cNvPr id="2" name="Titel 1">
-            <a:extLst>
-              <a:ext uri="{FF2B5EF4-FFF2-40B4-BE49-F238E27FC236}">
-                <a16:creationId xmlns:a16="http://schemas.microsoft.com/office/drawing/2014/main" id="{95863F39-AC6F-C91A-BC48-29EE6581525D}"/>
-              </a:ext>
-            </a:extLst>
-          </p:cNvPr>
-          <p:cNvSpPr>
-            <a:spLocks noGrp="1"/>
-          </p:cNvSpPr>
-          <p:nvPr>
-            <p:ph type="title"/>
-          </p:nvPr>
-        </p:nvSpPr>
-        <p:spPr/>
-        <p:txBody>
-          <a:bodyPr/>
-          <a:lstStyle/>
-          <a:p>
-            <a:r>
-              <a:rPr lang="de-DE" altLang="de-DE" dirty="0"/>
-              <a:t>Lokale Entwicklung mit Docker</a:t>
-            </a:r>
-            <a:endParaRPr lang="de-DE" dirty="0"/>
-          </a:p>
-        </p:txBody>
-      </p:sp>
-      <p:sp>
-        <p:nvSpPr>
-          <p:cNvPr id="3" name="Inhaltsplatzhalter 2">
-            <a:extLst>
-              <a:ext uri="{FF2B5EF4-FFF2-40B4-BE49-F238E27FC236}">
-                <a16:creationId xmlns:a16="http://schemas.microsoft.com/office/drawing/2014/main" id="{3ED41AEE-F238-EA07-C91E-34B4C1C3FDC0}"/>
-              </a:ext>
-            </a:extLst>
-          </p:cNvPr>
-          <p:cNvSpPr>
-            <a:spLocks noGrp="1"/>
-          </p:cNvSpPr>
-          <p:nvPr>
-            <p:ph idx="1"/>
-          </p:nvPr>
-        </p:nvSpPr>
-        <p:spPr>
-          <a:xfrm>
-            <a:off x="303213" y="3429000"/>
-            <a:ext cx="8516937" cy="2952750"/>
-          </a:xfrm>
-        </p:spPr>
-        <p:txBody>
-          <a:bodyPr/>
-          <a:lstStyle/>
-          <a:p>
-            <a:pPr>
-              <a:buFont typeface="Arial" panose="020B0604020202020204" pitchFamily="34" charset="0"/>
-              <a:buChar char="•"/>
-            </a:pPr>
-            <a:r>
-              <a:rPr lang="de-DE" dirty="0" err="1"/>
-              <a:t>docker</a:t>
-            </a:r>
-            <a:r>
-              <a:rPr lang="de-DE" dirty="0"/>
-              <a:t> erstellt und startet einen Container</a:t>
-            </a:r>
-          </a:p>
-          <a:p>
-            <a:pPr>
-              <a:buFont typeface="Arial" panose="020B0604020202020204" pitchFamily="34" charset="0"/>
-              <a:buChar char="•"/>
-            </a:pPr>
-            <a:r>
-              <a:rPr lang="de-DE" dirty="0"/>
-              <a:t>mit --name können Container benannt werden</a:t>
-            </a:r>
-          </a:p>
-          <a:p>
-            <a:pPr>
-              <a:buFont typeface="Arial" panose="020B0604020202020204" pitchFamily="34" charset="0"/>
-              <a:buChar char="•"/>
-            </a:pPr>
-            <a:r>
-              <a:rPr lang="de-DE" dirty="0"/>
-              <a:t>Viele weitere Optionen je nach Image und Applikation</a:t>
-            </a:r>
-          </a:p>
-          <a:p>
-            <a:pPr>
-              <a:buFont typeface="Arial" panose="020B0604020202020204" pitchFamily="34" charset="0"/>
-              <a:buChar char="•"/>
-            </a:pPr>
-            <a:r>
-              <a:rPr lang="de-DE" dirty="0"/>
-              <a:t>Container haben Namen und ID zur Identifikation</a:t>
-            </a:r>
-          </a:p>
-        </p:txBody>
-      </p:sp>
-      <p:sp>
-        <p:nvSpPr>
-          <p:cNvPr id="5" name="Textfeld 4">
-            <a:extLst>
-              <a:ext uri="{FF2B5EF4-FFF2-40B4-BE49-F238E27FC236}">
-                <a16:creationId xmlns:a16="http://schemas.microsoft.com/office/drawing/2014/main" id="{02FEDFB1-88E0-0AE1-5A10-FF6902E93AA4}"/>
-              </a:ext>
-            </a:extLst>
-          </p:cNvPr>
-          <p:cNvSpPr txBox="1"/>
-          <p:nvPr/>
-        </p:nvSpPr>
-        <p:spPr bwMode="auto">
-          <a:xfrm>
-            <a:off x="285720" y="1264406"/>
-            <a:ext cx="8516937" cy="584775"/>
-          </a:xfrm>
-          <a:prstGeom prst="rect">
-            <a:avLst/>
-          </a:prstGeom>
-          <a:noFill/>
-          <a:ln w="9525">
-            <a:noFill/>
-            <a:miter lim="800000"/>
-            <a:headEnd/>
-            <a:tailEnd/>
-          </a:ln>
-        </p:spPr>
-        <p:txBody>
-          <a:bodyPr wrap="square" rtlCol="0" anchor="ctr">
-            <a:spAutoFit/>
-          </a:bodyPr>
-          <a:lstStyle/>
-          <a:p>
-            <a:pPr algn="ctr" eaLnBrk="1" hangingPunct="1"/>
-            <a:r>
-              <a:rPr lang="de-DE" sz="3200" dirty="0">
-                <a:latin typeface="+mj-lt"/>
-              </a:rPr>
-              <a:t>Erstellen von Containern</a:t>
-            </a:r>
-          </a:p>
-        </p:txBody>
-      </p:sp>
-      <p:sp>
-        <p:nvSpPr>
-          <p:cNvPr id="6" name="Textfeld 5">
-            <a:extLst>
-              <a:ext uri="{FF2B5EF4-FFF2-40B4-BE49-F238E27FC236}">
-                <a16:creationId xmlns:a16="http://schemas.microsoft.com/office/drawing/2014/main" id="{4ACC5388-79C6-75D2-C169-4274E8C247EA}"/>
-              </a:ext>
-            </a:extLst>
-          </p:cNvPr>
-          <p:cNvSpPr txBox="1"/>
-          <p:nvPr/>
-        </p:nvSpPr>
-        <p:spPr bwMode="auto">
-          <a:xfrm>
-            <a:off x="297818" y="2007568"/>
-            <a:ext cx="8516937" cy="830997"/>
-          </a:xfrm>
-          <a:prstGeom prst="rect">
-            <a:avLst/>
-          </a:prstGeom>
-          <a:solidFill>
-            <a:schemeClr val="bg1">
-              <a:lumMod val="85000"/>
-            </a:schemeClr>
-          </a:solidFill>
-          <a:ln w="9525">
-            <a:noFill/>
-            <a:miter lim="800000"/>
-            <a:headEnd/>
-            <a:tailEnd/>
-          </a:ln>
-          <a:effectLst>
-            <a:softEdge rad="25400"/>
-          </a:effectLst>
-        </p:spPr>
-        <p:txBody>
-          <a:bodyPr wrap="square" rtlCol="0" anchor="ctr">
-            <a:spAutoFit/>
-          </a:bodyPr>
-          <a:lstStyle/>
-          <a:p>
-            <a:pPr algn="ctr" eaLnBrk="1" hangingPunct="1"/>
-            <a:r>
-              <a:rPr lang="de-DE" dirty="0" err="1">
-                <a:latin typeface="Arial" charset="0"/>
-              </a:rPr>
-              <a:t>docker</a:t>
-            </a:r>
-            <a:r>
-              <a:rPr lang="de-DE" dirty="0">
-                <a:latin typeface="Arial" charset="0"/>
-              </a:rPr>
-              <a:t> </a:t>
-            </a:r>
-            <a:r>
-              <a:rPr lang="de-DE" dirty="0" err="1">
-                <a:latin typeface="Arial" charset="0"/>
-              </a:rPr>
-              <a:t>run</a:t>
-            </a:r>
-            <a:r>
-              <a:rPr lang="de-DE" dirty="0">
-                <a:latin typeface="Arial" charset="0"/>
-              </a:rPr>
-              <a:t> </a:t>
-            </a:r>
-            <a:r>
-              <a:rPr lang="de-DE" dirty="0" err="1">
-                <a:latin typeface="Arial" charset="0"/>
-              </a:rPr>
-              <a:t>example</a:t>
-            </a:r>
-            <a:endParaRPr lang="de-DE" dirty="0">
-              <a:latin typeface="Arial" charset="0"/>
-            </a:endParaRPr>
-          </a:p>
-          <a:p>
-            <a:pPr algn="ctr" eaLnBrk="1" hangingPunct="1"/>
-            <a:r>
-              <a:rPr lang="de-DE" dirty="0" err="1">
-                <a:latin typeface="Arial" charset="0"/>
-              </a:rPr>
-              <a:t>docker</a:t>
-            </a:r>
-            <a:r>
-              <a:rPr lang="de-DE" dirty="0">
-                <a:latin typeface="Arial" charset="0"/>
-              </a:rPr>
-              <a:t> </a:t>
-            </a:r>
-            <a:r>
-              <a:rPr lang="de-DE" dirty="0" err="1">
-                <a:latin typeface="Arial" charset="0"/>
-              </a:rPr>
-              <a:t>create</a:t>
-            </a:r>
-            <a:r>
-              <a:rPr lang="de-DE" dirty="0">
-                <a:latin typeface="Arial" charset="0"/>
-              </a:rPr>
-              <a:t> </a:t>
-            </a:r>
-            <a:r>
-              <a:rPr lang="de-DE" dirty="0" err="1">
-                <a:latin typeface="Arial" charset="0"/>
-              </a:rPr>
-              <a:t>example</a:t>
-            </a:r>
-            <a:endParaRPr lang="de-DE" dirty="0">
-              <a:latin typeface="Arial" charset="0"/>
-            </a:endParaRPr>
-          </a:p>
-        </p:txBody>
-      </p:sp>
-    </p:spTree>
-    <p:extLst>
-      <p:ext uri="{BB962C8B-B14F-4D97-AF65-F5344CB8AC3E}">
-        <p14:creationId xmlns:p14="http://schemas.microsoft.com/office/powerpoint/2010/main" val="4065056465"/>
       </p:ext>
     </p:extLst>
   </p:cSld>

</xml_diff>

<commit_message>
Docker Registry Deployment Strategien
</commit_message>
<xml_diff>
--- a/slides/Tag-3_1-Docker.pptx
+++ b/slides/Tag-3_1-Docker.pptx
@@ -6,10 +6,10 @@
     <p:sldMasterId id="2147483649" r:id="rId2"/>
   </p:sldMasterIdLst>
   <p:notesMasterIdLst>
-    <p:notesMasterId r:id="rId20"/>
+    <p:notesMasterId r:id="rId21"/>
   </p:notesMasterIdLst>
   <p:handoutMasterIdLst>
-    <p:handoutMasterId r:id="rId21"/>
+    <p:handoutMasterId r:id="rId22"/>
   </p:handoutMasterIdLst>
   <p:sldIdLst>
     <p:sldId id="289" r:id="rId3"/>
@@ -19,16 +19,17 @@
     <p:sldId id="309" r:id="rId7"/>
     <p:sldId id="293" r:id="rId8"/>
     <p:sldId id="296" r:id="rId9"/>
-    <p:sldId id="298" r:id="rId10"/>
-    <p:sldId id="299" r:id="rId11"/>
-    <p:sldId id="300" r:id="rId12"/>
-    <p:sldId id="301" r:id="rId13"/>
-    <p:sldId id="302" r:id="rId14"/>
-    <p:sldId id="303" r:id="rId15"/>
-    <p:sldId id="305" r:id="rId16"/>
-    <p:sldId id="306" r:id="rId17"/>
-    <p:sldId id="307" r:id="rId18"/>
-    <p:sldId id="304" r:id="rId19"/>
+    <p:sldId id="310" r:id="rId10"/>
+    <p:sldId id="298" r:id="rId11"/>
+    <p:sldId id="299" r:id="rId12"/>
+    <p:sldId id="300" r:id="rId13"/>
+    <p:sldId id="301" r:id="rId14"/>
+    <p:sldId id="302" r:id="rId15"/>
+    <p:sldId id="303" r:id="rId16"/>
+    <p:sldId id="305" r:id="rId17"/>
+    <p:sldId id="306" r:id="rId18"/>
+    <p:sldId id="307" r:id="rId19"/>
+    <p:sldId id="304" r:id="rId20"/>
   </p:sldIdLst>
   <p:sldSz cx="9144000" cy="6858000" type="screen4x3"/>
   <p:notesSz cx="6784975" cy="9921875"/>
@@ -1172,7 +1173,7 @@
             <a:fld id="{18182567-388C-4D33-8B7B-A651F195F118}" type="slidenum">
               <a:rPr lang="de-DE" altLang="de-DE" smtClean="0"/>
               <a:pPr/>
-              <a:t>11</a:t>
+              <a:t>12</a:t>
             </a:fld>
             <a:endParaRPr lang="de-DE" altLang="de-DE"/>
           </a:p>
@@ -1540,7 +1541,7 @@
               <a:pPr algn="ctr">
                 <a:defRPr/>
               </a:pPr>
-              <a:t>29.05.2024</a:t>
+              <a:t>31.05.2024</a:t>
             </a:fld>
             <a:endParaRPr lang="de-DE" sz="1000">
               <a:solidFill>
@@ -3587,6 +3588,224 @@
           <p:cNvPr id="2" name="Titel 1">
             <a:extLst>
               <a:ext uri="{FF2B5EF4-FFF2-40B4-BE49-F238E27FC236}">
+                <a16:creationId xmlns:a16="http://schemas.microsoft.com/office/drawing/2014/main" id="{DCC790D7-E6E3-398A-4B67-16E1FB9913F6}"/>
+              </a:ext>
+            </a:extLst>
+          </p:cNvPr>
+          <p:cNvSpPr>
+            <a:spLocks noGrp="1"/>
+          </p:cNvSpPr>
+          <p:nvPr>
+            <p:ph type="title"/>
+          </p:nvPr>
+        </p:nvSpPr>
+        <p:spPr/>
+        <p:txBody>
+          <a:bodyPr/>
+          <a:lstStyle/>
+          <a:p>
+            <a:r>
+              <a:rPr lang="de-DE" altLang="de-DE" dirty="0"/>
+              <a:t>Lokale Entwicklung mit Docker</a:t>
+            </a:r>
+            <a:endParaRPr lang="de-DE" dirty="0"/>
+          </a:p>
+        </p:txBody>
+      </p:sp>
+      <p:sp>
+        <p:nvSpPr>
+          <p:cNvPr id="3" name="Inhaltsplatzhalter 2">
+            <a:extLst>
+              <a:ext uri="{FF2B5EF4-FFF2-40B4-BE49-F238E27FC236}">
+                <a16:creationId xmlns:a16="http://schemas.microsoft.com/office/drawing/2014/main" id="{684639B2-6C8D-6B20-E376-7BC7E127E617}"/>
+              </a:ext>
+            </a:extLst>
+          </p:cNvPr>
+          <p:cNvSpPr>
+            <a:spLocks noGrp="1"/>
+          </p:cNvSpPr>
+          <p:nvPr>
+            <p:ph idx="1"/>
+          </p:nvPr>
+        </p:nvSpPr>
+        <p:spPr>
+          <a:xfrm>
+            <a:off x="303213" y="2132856"/>
+            <a:ext cx="8516937" cy="1296144"/>
+          </a:xfrm>
+        </p:spPr>
+        <p:txBody>
+          <a:bodyPr/>
+          <a:lstStyle/>
+          <a:p>
+            <a:pPr>
+              <a:buFont typeface="Arial" panose="020B0604020202020204" pitchFamily="34" charset="0"/>
+              <a:buChar char="•"/>
+            </a:pPr>
+            <a:r>
+              <a:rPr lang="de-DE" dirty="0"/>
+              <a:t>Erstellung mittels </a:t>
+            </a:r>
+            <a:r>
+              <a:rPr lang="de-DE" dirty="0" err="1"/>
+              <a:t>Dockerfile</a:t>
+            </a:r>
+            <a:endParaRPr lang="de-DE" dirty="0"/>
+          </a:p>
+          <a:p>
+            <a:pPr>
+              <a:buFont typeface="Arial" panose="020B0604020202020204" pitchFamily="34" charset="0"/>
+              <a:buChar char="•"/>
+            </a:pPr>
+            <a:r>
+              <a:rPr lang="de-DE" dirty="0"/>
+              <a:t>Definiert die einzelnen Schichten</a:t>
+            </a:r>
+          </a:p>
+          <a:p>
+            <a:pPr>
+              <a:buFont typeface="Arial" panose="020B0604020202020204" pitchFamily="34" charset="0"/>
+              <a:buChar char="•"/>
+            </a:pPr>
+            <a:r>
+              <a:rPr lang="de-DE" dirty="0"/>
+              <a:t>Schichten werden </a:t>
+            </a:r>
+            <a:r>
+              <a:rPr lang="de-DE" dirty="0" err="1"/>
+              <a:t>gecached</a:t>
+            </a:r>
+            <a:endParaRPr lang="de-DE" dirty="0"/>
+          </a:p>
+          <a:p>
+            <a:pPr marL="0" indent="0">
+              <a:buNone/>
+            </a:pPr>
+            <a:endParaRPr lang="de-DE" dirty="0"/>
+          </a:p>
+          <a:p>
+            <a:pPr>
+              <a:buFont typeface="Arial" panose="020B0604020202020204" pitchFamily="34" charset="0"/>
+              <a:buChar char="•"/>
+            </a:pPr>
+            <a:endParaRPr lang="de-DE" dirty="0"/>
+          </a:p>
+        </p:txBody>
+      </p:sp>
+      <p:sp>
+        <p:nvSpPr>
+          <p:cNvPr id="4" name="Textfeld 3">
+            <a:extLst>
+              <a:ext uri="{FF2B5EF4-FFF2-40B4-BE49-F238E27FC236}">
+                <a16:creationId xmlns:a16="http://schemas.microsoft.com/office/drawing/2014/main" id="{517F76CB-91F9-E4B6-387A-CC772F30AFA9}"/>
+              </a:ext>
+            </a:extLst>
+          </p:cNvPr>
+          <p:cNvSpPr txBox="1"/>
+          <p:nvPr/>
+        </p:nvSpPr>
+        <p:spPr bwMode="auto">
+          <a:xfrm>
+            <a:off x="285720" y="1264406"/>
+            <a:ext cx="8516937" cy="584775"/>
+          </a:xfrm>
+          <a:prstGeom prst="rect">
+            <a:avLst/>
+          </a:prstGeom>
+          <a:noFill/>
+          <a:ln w="9525">
+            <a:noFill/>
+            <a:miter lim="800000"/>
+            <a:headEnd/>
+            <a:tailEnd/>
+          </a:ln>
+        </p:spPr>
+        <p:txBody>
+          <a:bodyPr wrap="square" rtlCol="0" anchor="ctr">
+            <a:spAutoFit/>
+          </a:bodyPr>
+          <a:lstStyle/>
+          <a:p>
+            <a:pPr algn="ctr" eaLnBrk="1" hangingPunct="1"/>
+            <a:r>
+              <a:rPr lang="de-DE" sz="3200" dirty="0">
+                <a:latin typeface="+mj-lt"/>
+              </a:rPr>
+              <a:t>Erstellen von Images</a:t>
+            </a:r>
+          </a:p>
+        </p:txBody>
+      </p:sp>
+      <p:pic>
+        <p:nvPicPr>
+          <p:cNvPr id="6" name="Grafik 5">
+            <a:extLst>
+              <a:ext uri="{FF2B5EF4-FFF2-40B4-BE49-F238E27FC236}">
+                <a16:creationId xmlns:a16="http://schemas.microsoft.com/office/drawing/2014/main" id="{366E276A-F5D5-247A-7912-37944920DA79}"/>
+              </a:ext>
+            </a:extLst>
+          </p:cNvPr>
+          <p:cNvPicPr>
+            <a:picLocks noChangeAspect="1"/>
+          </p:cNvPicPr>
+          <p:nvPr/>
+        </p:nvPicPr>
+        <p:blipFill>
+          <a:blip r:embed="rId2">
+            <a:extLst>
+              <a:ext uri="{28A0092B-C50C-407E-A947-70E740481C1C}">
+                <a14:useLocalDpi xmlns:a14="http://schemas.microsoft.com/office/drawing/2010/main" val="0"/>
+              </a:ext>
+            </a:extLst>
+          </a:blip>
+          <a:srcRect/>
+          <a:stretch/>
+        </p:blipFill>
+        <p:spPr>
+          <a:xfrm>
+            <a:off x="2979741" y="3681028"/>
+            <a:ext cx="3184517" cy="2376264"/>
+          </a:xfrm>
+          <a:prstGeom prst="rect">
+            <a:avLst/>
+          </a:prstGeom>
+        </p:spPr>
+      </p:pic>
+    </p:spTree>
+    <p:extLst>
+      <p:ext uri="{BB962C8B-B14F-4D97-AF65-F5344CB8AC3E}">
+        <p14:creationId xmlns:p14="http://schemas.microsoft.com/office/powerpoint/2010/main" val="2209957316"/>
+      </p:ext>
+    </p:extLst>
+  </p:cSld>
+  <p:clrMapOvr>
+    <a:masterClrMapping/>
+  </p:clrMapOvr>
+</p:sld>
+</file>
+
+<file path=ppt/slides/slide11.xml><?xml version="1.0" encoding="utf-8"?>
+<p:sld xmlns:a="http://schemas.openxmlformats.org/drawingml/2006/main" xmlns:r="http://schemas.openxmlformats.org/officeDocument/2006/relationships" xmlns:p="http://schemas.openxmlformats.org/presentationml/2006/main">
+  <p:cSld>
+    <p:spTree>
+      <p:nvGrpSpPr>
+        <p:cNvPr id="1" name=""/>
+        <p:cNvGrpSpPr/>
+        <p:nvPr/>
+      </p:nvGrpSpPr>
+      <p:grpSpPr>
+        <a:xfrm>
+          <a:off x="0" y="0"/>
+          <a:ext cx="0" cy="0"/>
+          <a:chOff x="0" y="0"/>
+          <a:chExt cx="0" cy="0"/>
+        </a:xfrm>
+      </p:grpSpPr>
+      <p:sp>
+        <p:nvSpPr>
+          <p:cNvPr id="2" name="Titel 1">
+            <a:extLst>
+              <a:ext uri="{FF2B5EF4-FFF2-40B4-BE49-F238E27FC236}">
                 <a16:creationId xmlns:a16="http://schemas.microsoft.com/office/drawing/2014/main" id="{850FF3C7-B3ED-0A8B-5D14-2B093646715A}"/>
               </a:ext>
             </a:extLst>
@@ -3856,7 +4075,7 @@
 </p:sld>
 </file>
 
-<file path=ppt/slides/slide11.xml><?xml version="1.0" encoding="utf-8"?>
+<file path=ppt/slides/slide12.xml><?xml version="1.0" encoding="utf-8"?>
 <p:sld xmlns:a="http://schemas.openxmlformats.org/drawingml/2006/main" xmlns:r="http://schemas.openxmlformats.org/officeDocument/2006/relationships" xmlns:p="http://schemas.openxmlformats.org/presentationml/2006/main">
   <p:cSld>
     <p:spTree>
@@ -4144,7 +4363,7 @@
 </p:sld>
 </file>
 
-<file path=ppt/slides/slide12.xml><?xml version="1.0" encoding="utf-8"?>
+<file path=ppt/slides/slide13.xml><?xml version="1.0" encoding="utf-8"?>
 <p:sld xmlns:a="http://schemas.openxmlformats.org/drawingml/2006/main" xmlns:r="http://schemas.openxmlformats.org/officeDocument/2006/relationships" xmlns:p="http://schemas.openxmlformats.org/presentationml/2006/main">
   <p:cSld>
     <p:spTree>
@@ -5979,7 +6198,7 @@
 </p:sld>
 </file>
 
-<file path=ppt/slides/slide13.xml><?xml version="1.0" encoding="utf-8"?>
+<file path=ppt/slides/slide14.xml><?xml version="1.0" encoding="utf-8"?>
 <p:sld xmlns:a="http://schemas.openxmlformats.org/drawingml/2006/main" xmlns:r="http://schemas.openxmlformats.org/officeDocument/2006/relationships" xmlns:p="http://schemas.openxmlformats.org/presentationml/2006/main">
   <p:cSld>
     <p:spTree>
@@ -6179,7 +6398,7 @@
               <a:rPr lang="de-DE" sz="3200" dirty="0">
                 <a:latin typeface="+mj-lt"/>
               </a:rPr>
-              <a:t>Erstellen von Images</a:t>
+              <a:t>Übungsaufgabe</a:t>
             </a:r>
           </a:p>
         </p:txBody>
@@ -6197,7 +6416,7 @@
 </p:sld>
 </file>
 
-<file path=ppt/slides/slide14.xml><?xml version="1.0" encoding="utf-8"?>
+<file path=ppt/slides/slide15.xml><?xml version="1.0" encoding="utf-8"?>
 <p:sld xmlns:a="http://schemas.openxmlformats.org/drawingml/2006/main" xmlns:r="http://schemas.openxmlformats.org/officeDocument/2006/relationships" xmlns:p="http://schemas.openxmlformats.org/presentationml/2006/main">
   <p:cSld>
     <p:spTree>
@@ -7266,7 +7485,7 @@
 </p:sld>
 </file>
 
-<file path=ppt/slides/slide15.xml><?xml version="1.0" encoding="utf-8"?>
+<file path=ppt/slides/slide16.xml><?xml version="1.0" encoding="utf-8"?>
 <p:sld xmlns:a="http://schemas.openxmlformats.org/drawingml/2006/main" xmlns:r="http://schemas.openxmlformats.org/officeDocument/2006/relationships" xmlns:p="http://schemas.openxmlformats.org/presentationml/2006/main">
   <p:cSld>
     <p:spTree>
@@ -7750,7 +7969,7 @@
 </p:sld>
 </file>
 
-<file path=ppt/slides/slide16.xml><?xml version="1.0" encoding="utf-8"?>
+<file path=ppt/slides/slide17.xml><?xml version="1.0" encoding="utf-8"?>
 <p:sld xmlns:a="http://schemas.openxmlformats.org/drawingml/2006/main" xmlns:r="http://schemas.openxmlformats.org/officeDocument/2006/relationships" xmlns:p="http://schemas.openxmlformats.org/presentationml/2006/main">
   <p:cSld>
     <p:spTree>
@@ -7981,7 +8200,7 @@
 </p:sld>
 </file>
 
-<file path=ppt/slides/slide17.xml><?xml version="1.0" encoding="utf-8"?>
+<file path=ppt/slides/slide18.xml><?xml version="1.0" encoding="utf-8"?>
 <p:sld xmlns:a="http://schemas.openxmlformats.org/drawingml/2006/main" xmlns:r="http://schemas.openxmlformats.org/officeDocument/2006/relationships" xmlns:p="http://schemas.openxmlformats.org/presentationml/2006/main">
   <p:cSld>
     <p:spTree>
@@ -9408,6 +9627,510 @@
 </file>
 
 <file path=ppt/slides/slide8.xml><?xml version="1.0" encoding="utf-8"?>
+<p:sld xmlns:a="http://schemas.openxmlformats.org/drawingml/2006/main" xmlns:r="http://schemas.openxmlformats.org/officeDocument/2006/relationships" xmlns:p="http://schemas.openxmlformats.org/presentationml/2006/main">
+  <p:cSld>
+    <p:spTree>
+      <p:nvGrpSpPr>
+        <p:cNvPr id="1" name=""/>
+        <p:cNvGrpSpPr/>
+        <p:nvPr/>
+      </p:nvGrpSpPr>
+      <p:grpSpPr>
+        <a:xfrm>
+          <a:off x="0" y="0"/>
+          <a:ext cx="0" cy="0"/>
+          <a:chOff x="0" y="0"/>
+          <a:chExt cx="0" cy="0"/>
+        </a:xfrm>
+      </p:grpSpPr>
+      <p:sp>
+        <p:nvSpPr>
+          <p:cNvPr id="2" name="Titel 1">
+            <a:extLst>
+              <a:ext uri="{FF2B5EF4-FFF2-40B4-BE49-F238E27FC236}">
+                <a16:creationId xmlns:a16="http://schemas.microsoft.com/office/drawing/2014/main" id="{15A7EAB6-74ED-54FA-3F14-5963C1F38E04}"/>
+              </a:ext>
+            </a:extLst>
+          </p:cNvPr>
+          <p:cNvSpPr>
+            <a:spLocks noGrp="1"/>
+          </p:cNvSpPr>
+          <p:nvPr>
+            <p:ph type="title"/>
+          </p:nvPr>
+        </p:nvSpPr>
+        <p:spPr/>
+        <p:txBody>
+          <a:bodyPr/>
+          <a:lstStyle/>
+          <a:p>
+            <a:r>
+              <a:rPr lang="de-DE" altLang="de-DE" dirty="0"/>
+              <a:t>Lokale Entwicklung mit Docker</a:t>
+            </a:r>
+            <a:endParaRPr lang="de-DE" dirty="0"/>
+          </a:p>
+        </p:txBody>
+      </p:sp>
+      <p:sp>
+        <p:nvSpPr>
+          <p:cNvPr id="3" name="Inhaltsplatzhalter 2">
+            <a:extLst>
+              <a:ext uri="{FF2B5EF4-FFF2-40B4-BE49-F238E27FC236}">
+                <a16:creationId xmlns:a16="http://schemas.microsoft.com/office/drawing/2014/main" id="{E3A0C048-49AD-EA74-C1E3-85986D3E380A}"/>
+              </a:ext>
+            </a:extLst>
+          </p:cNvPr>
+          <p:cNvSpPr>
+            <a:spLocks noGrp="1"/>
+          </p:cNvSpPr>
+          <p:nvPr>
+            <p:ph idx="1"/>
+          </p:nvPr>
+        </p:nvSpPr>
+        <p:spPr>
+          <a:xfrm>
+            <a:off x="303213" y="1916832"/>
+            <a:ext cx="8516937" cy="1872208"/>
+          </a:xfrm>
+        </p:spPr>
+        <p:txBody>
+          <a:bodyPr/>
+          <a:lstStyle/>
+          <a:p>
+            <a:pPr>
+              <a:buFont typeface="Arial" panose="020B0604020202020204" pitchFamily="34" charset="0"/>
+              <a:buChar char="•"/>
+            </a:pPr>
+            <a:r>
+              <a:rPr lang="de-DE" dirty="0"/>
+              <a:t>Remote Storage für Images</a:t>
+            </a:r>
+          </a:p>
+          <a:p>
+            <a:pPr>
+              <a:buFont typeface="Arial" panose="020B0604020202020204" pitchFamily="34" charset="0"/>
+              <a:buChar char="•"/>
+            </a:pPr>
+            <a:r>
+              <a:rPr lang="de-DE" dirty="0"/>
+              <a:t>Können mit tags gepusht und gepullt werden</a:t>
+            </a:r>
+          </a:p>
+          <a:p>
+            <a:pPr>
+              <a:buFont typeface="Arial" panose="020B0604020202020204" pitchFamily="34" charset="0"/>
+              <a:buChar char="•"/>
+            </a:pPr>
+            <a:r>
+              <a:rPr lang="de-DE" dirty="0"/>
+              <a:t>Gibt öffentliche </a:t>
+            </a:r>
+            <a:r>
+              <a:rPr lang="de-DE" dirty="0" err="1"/>
+              <a:t>Registries</a:t>
+            </a:r>
+            <a:r>
+              <a:rPr lang="de-DE" dirty="0"/>
+              <a:t> (</a:t>
+            </a:r>
+            <a:r>
+              <a:rPr lang="de-DE" dirty="0" err="1"/>
+              <a:t>DockerHub</a:t>
+            </a:r>
+            <a:r>
+              <a:rPr lang="de-DE" dirty="0"/>
+              <a:t>)</a:t>
+            </a:r>
+          </a:p>
+          <a:p>
+            <a:pPr>
+              <a:buFont typeface="Arial" panose="020B0604020202020204" pitchFamily="34" charset="0"/>
+              <a:buChar char="•"/>
+            </a:pPr>
+            <a:r>
+              <a:rPr lang="de-DE" dirty="0"/>
+              <a:t>Private </a:t>
+            </a:r>
+            <a:r>
+              <a:rPr lang="de-DE" dirty="0" err="1"/>
+              <a:t>Registries</a:t>
+            </a:r>
+            <a:r>
+              <a:rPr lang="de-DE" dirty="0"/>
+              <a:t> können selbst gehostet werden</a:t>
+            </a:r>
+          </a:p>
+        </p:txBody>
+      </p:sp>
+      <p:sp>
+        <p:nvSpPr>
+          <p:cNvPr id="4" name="Textfeld 3">
+            <a:extLst>
+              <a:ext uri="{FF2B5EF4-FFF2-40B4-BE49-F238E27FC236}">
+                <a16:creationId xmlns:a16="http://schemas.microsoft.com/office/drawing/2014/main" id="{89E3EAE0-45BD-4E08-C462-729D904F4390}"/>
+              </a:ext>
+            </a:extLst>
+          </p:cNvPr>
+          <p:cNvSpPr txBox="1"/>
+          <p:nvPr/>
+        </p:nvSpPr>
+        <p:spPr bwMode="auto">
+          <a:xfrm>
+            <a:off x="323528" y="1181364"/>
+            <a:ext cx="8496944" cy="584775"/>
+          </a:xfrm>
+          <a:prstGeom prst="rect">
+            <a:avLst/>
+          </a:prstGeom>
+          <a:noFill/>
+          <a:ln w="9525">
+            <a:noFill/>
+            <a:miter lim="800000"/>
+            <a:headEnd/>
+            <a:tailEnd/>
+          </a:ln>
+        </p:spPr>
+        <p:txBody>
+          <a:bodyPr wrap="square" rtlCol="0" anchor="ctr">
+            <a:spAutoFit/>
+          </a:bodyPr>
+          <a:lstStyle/>
+          <a:p>
+            <a:pPr algn="ctr" eaLnBrk="1" hangingPunct="1"/>
+            <a:r>
+              <a:rPr lang="de-DE" sz="3200" dirty="0">
+                <a:latin typeface="+mj-lt"/>
+              </a:rPr>
+              <a:t>Docker </a:t>
+            </a:r>
+            <a:r>
+              <a:rPr lang="de-DE" sz="3200" dirty="0" err="1">
+                <a:latin typeface="+mj-lt"/>
+              </a:rPr>
+              <a:t>Registries</a:t>
+            </a:r>
+            <a:endParaRPr lang="de-DE" sz="3200" dirty="0">
+              <a:latin typeface="+mj-lt"/>
+            </a:endParaRPr>
+          </a:p>
+        </p:txBody>
+      </p:sp>
+      <p:sp>
+        <p:nvSpPr>
+          <p:cNvPr id="5" name="Wolke 4">
+            <a:extLst>
+              <a:ext uri="{FF2B5EF4-FFF2-40B4-BE49-F238E27FC236}">
+                <a16:creationId xmlns:a16="http://schemas.microsoft.com/office/drawing/2014/main" id="{51EE1670-391D-CCD3-5B0A-16118DFF850B}"/>
+              </a:ext>
+            </a:extLst>
+          </p:cNvPr>
+          <p:cNvSpPr/>
+          <p:nvPr/>
+        </p:nvSpPr>
+        <p:spPr bwMode="auto">
+          <a:xfrm>
+            <a:off x="3493489" y="3939733"/>
+            <a:ext cx="2157021" cy="1038304"/>
+          </a:xfrm>
+          <a:prstGeom prst="cloud">
+            <a:avLst/>
+          </a:prstGeom>
+          <a:solidFill>
+            <a:schemeClr val="accent1"/>
+          </a:solidFill>
+          <a:ln w="12700" cap="flat" cmpd="sng" algn="ctr">
+            <a:solidFill>
+              <a:schemeClr val="tx1"/>
+            </a:solidFill>
+            <a:prstDash val="solid"/>
+            <a:round/>
+            <a:headEnd type="none" w="sm" len="sm"/>
+            <a:tailEnd type="none" w="sm" len="sm"/>
+          </a:ln>
+          <a:effectLst/>
+        </p:spPr>
+        <p:txBody>
+          <a:bodyPr vert="horz" wrap="square" lIns="91440" tIns="45720" rIns="91440" bIns="45720" numCol="1" rtlCol="0" anchor="ctr" anchorCtr="0" compatLnSpc="1">
+            <a:prstTxWarp prst="textNoShape">
+              <a:avLst/>
+            </a:prstTxWarp>
+          </a:bodyPr>
+          <a:lstStyle/>
+          <a:p>
+            <a:pPr marL="0" marR="0" indent="0" algn="ctr" defTabSz="914400" rtl="0" eaLnBrk="0" fontAlgn="base" latinLnBrk="0" hangingPunct="0">
+              <a:lnSpc>
+                <a:spcPct val="100000"/>
+              </a:lnSpc>
+              <a:spcBef>
+                <a:spcPct val="0"/>
+              </a:spcBef>
+              <a:spcAft>
+                <a:spcPct val="0"/>
+              </a:spcAft>
+              <a:buClrTx/>
+              <a:buSzTx/>
+              <a:buFontTx/>
+              <a:buNone/>
+              <a:tabLst/>
+            </a:pPr>
+            <a:r>
+              <a:rPr lang="de-DE" dirty="0">
+                <a:latin typeface="+mn-lt"/>
+              </a:rPr>
+              <a:t>Registry</a:t>
+            </a:r>
+            <a:endParaRPr kumimoji="0" lang="de-DE" sz="2400" b="0" i="0" u="none" strike="noStrike" cap="none" normalizeH="0" baseline="0" dirty="0">
+              <a:ln>
+                <a:noFill/>
+              </a:ln>
+              <a:solidFill>
+                <a:schemeClr val="tx1"/>
+              </a:solidFill>
+              <a:effectLst/>
+              <a:latin typeface="+mn-lt"/>
+            </a:endParaRPr>
+          </a:p>
+        </p:txBody>
+      </p:sp>
+      <p:pic>
+        <p:nvPicPr>
+          <p:cNvPr id="7" name="Grafik 6" descr="Monitor Silhouette">
+            <a:extLst>
+              <a:ext uri="{FF2B5EF4-FFF2-40B4-BE49-F238E27FC236}">
+                <a16:creationId xmlns:a16="http://schemas.microsoft.com/office/drawing/2014/main" id="{341F74B7-DB47-090F-980C-19F3FD23953F}"/>
+              </a:ext>
+            </a:extLst>
+          </p:cNvPr>
+          <p:cNvPicPr>
+            <a:picLocks noChangeAspect="1"/>
+          </p:cNvPicPr>
+          <p:nvPr/>
+        </p:nvPicPr>
+        <p:blipFill>
+          <a:blip r:embed="rId2">
+            <a:extLst>
+              <a:ext uri="{28A0092B-C50C-407E-A947-70E740481C1C}">
+                <a14:useLocalDpi xmlns:a14="http://schemas.microsoft.com/office/drawing/2010/main" val="0"/>
+              </a:ext>
+              <a:ext uri="{96DAC541-7B7A-43D3-8B79-37D633B846F1}">
+                <asvg:svgBlip xmlns:asvg="http://schemas.microsoft.com/office/drawing/2016/SVG/main" r:embed="rId3"/>
+              </a:ext>
+            </a:extLst>
+          </a:blip>
+          <a:stretch>
+            <a:fillRect/>
+          </a:stretch>
+        </p:blipFill>
+        <p:spPr>
+          <a:xfrm>
+            <a:off x="5677163" y="5371836"/>
+            <a:ext cx="914400" cy="914400"/>
+          </a:xfrm>
+          <a:prstGeom prst="rect">
+            <a:avLst/>
+          </a:prstGeom>
+        </p:spPr>
+      </p:pic>
+      <p:pic>
+        <p:nvPicPr>
+          <p:cNvPr id="8" name="Grafik 7" descr="Monitor Silhouette">
+            <a:extLst>
+              <a:ext uri="{FF2B5EF4-FFF2-40B4-BE49-F238E27FC236}">
+                <a16:creationId xmlns:a16="http://schemas.microsoft.com/office/drawing/2014/main" id="{FA362283-6780-DFD5-A58E-CEF2FB4EA592}"/>
+              </a:ext>
+            </a:extLst>
+          </p:cNvPr>
+          <p:cNvPicPr>
+            <a:picLocks noChangeAspect="1"/>
+          </p:cNvPicPr>
+          <p:nvPr/>
+        </p:nvPicPr>
+        <p:blipFill>
+          <a:blip r:embed="rId2">
+            <a:extLst>
+              <a:ext uri="{28A0092B-C50C-407E-A947-70E740481C1C}">
+                <a14:useLocalDpi xmlns:a14="http://schemas.microsoft.com/office/drawing/2010/main" val="0"/>
+              </a:ext>
+              <a:ext uri="{96DAC541-7B7A-43D3-8B79-37D633B846F1}">
+                <asvg:svgBlip xmlns:asvg="http://schemas.microsoft.com/office/drawing/2016/SVG/main" r:embed="rId3"/>
+              </a:ext>
+            </a:extLst>
+          </a:blip>
+          <a:stretch>
+            <a:fillRect/>
+          </a:stretch>
+        </p:blipFill>
+        <p:spPr>
+          <a:xfrm>
+            <a:off x="6950414" y="5371836"/>
+            <a:ext cx="914400" cy="914400"/>
+          </a:xfrm>
+          <a:prstGeom prst="rect">
+            <a:avLst/>
+          </a:prstGeom>
+        </p:spPr>
+      </p:pic>
+      <p:pic>
+        <p:nvPicPr>
+          <p:cNvPr id="9" name="Grafik 8" descr="Monitor Silhouette">
+            <a:extLst>
+              <a:ext uri="{FF2B5EF4-FFF2-40B4-BE49-F238E27FC236}">
+                <a16:creationId xmlns:a16="http://schemas.microsoft.com/office/drawing/2014/main" id="{94934086-A753-0C43-7E9C-A2335884155B}"/>
+              </a:ext>
+            </a:extLst>
+          </p:cNvPr>
+          <p:cNvPicPr>
+            <a:picLocks noChangeAspect="1"/>
+          </p:cNvPicPr>
+          <p:nvPr/>
+        </p:nvPicPr>
+        <p:blipFill>
+          <a:blip r:embed="rId2">
+            <a:extLst>
+              <a:ext uri="{28A0092B-C50C-407E-A947-70E740481C1C}">
+                <a14:useLocalDpi xmlns:a14="http://schemas.microsoft.com/office/drawing/2010/main" val="0"/>
+              </a:ext>
+              <a:ext uri="{96DAC541-7B7A-43D3-8B79-37D633B846F1}">
+                <asvg:svgBlip xmlns:asvg="http://schemas.microsoft.com/office/drawing/2016/SVG/main" r:embed="rId3"/>
+              </a:ext>
+            </a:extLst>
+          </a:blip>
+          <a:stretch>
+            <a:fillRect/>
+          </a:stretch>
+        </p:blipFill>
+        <p:spPr>
+          <a:xfrm>
+            <a:off x="2411760" y="5371836"/>
+            <a:ext cx="914400" cy="914400"/>
+          </a:xfrm>
+          <a:prstGeom prst="rect">
+            <a:avLst/>
+          </a:prstGeom>
+        </p:spPr>
+      </p:pic>
+      <p:cxnSp>
+        <p:nvCxnSpPr>
+          <p:cNvPr id="11" name="Gerade Verbindung mit Pfeil 10">
+            <a:extLst>
+              <a:ext uri="{FF2B5EF4-FFF2-40B4-BE49-F238E27FC236}">
+                <a16:creationId xmlns:a16="http://schemas.microsoft.com/office/drawing/2014/main" id="{4254DA33-40E3-89C9-DEB5-4630EB2BBE5D}"/>
+              </a:ext>
+            </a:extLst>
+          </p:cNvPr>
+          <p:cNvCxnSpPr/>
+          <p:nvPr/>
+        </p:nvCxnSpPr>
+        <p:spPr bwMode="auto">
+          <a:xfrm flipV="1">
+            <a:off x="2868960" y="4725144"/>
+            <a:ext cx="457200" cy="646692"/>
+          </a:xfrm>
+          <a:prstGeom prst="straightConnector1">
+            <a:avLst/>
+          </a:prstGeom>
+          <a:solidFill>
+            <a:schemeClr val="accent1"/>
+          </a:solidFill>
+          <a:ln w="12700" cap="flat" cmpd="sng" algn="ctr">
+            <a:solidFill>
+              <a:schemeClr val="tx1"/>
+            </a:solidFill>
+            <a:prstDash val="solid"/>
+            <a:round/>
+            <a:headEnd type="none" w="sm" len="sm"/>
+            <a:tailEnd type="triangle"/>
+          </a:ln>
+          <a:effectLst/>
+        </p:spPr>
+      </p:cxnSp>
+      <p:cxnSp>
+        <p:nvCxnSpPr>
+          <p:cNvPr id="13" name="Gerade Verbindung mit Pfeil 12">
+            <a:extLst>
+              <a:ext uri="{FF2B5EF4-FFF2-40B4-BE49-F238E27FC236}">
+                <a16:creationId xmlns:a16="http://schemas.microsoft.com/office/drawing/2014/main" id="{B0626A77-E6E7-C0EE-9CE9-67DAC9B9FFA3}"/>
+              </a:ext>
+            </a:extLst>
+          </p:cNvPr>
+          <p:cNvCxnSpPr>
+            <a:cxnSpLocks/>
+          </p:cNvCxnSpPr>
+          <p:nvPr/>
+        </p:nvCxnSpPr>
+        <p:spPr bwMode="auto">
+          <a:xfrm>
+            <a:off x="5677163" y="4725144"/>
+            <a:ext cx="457200" cy="646692"/>
+          </a:xfrm>
+          <a:prstGeom prst="straightConnector1">
+            <a:avLst/>
+          </a:prstGeom>
+          <a:solidFill>
+            <a:schemeClr val="accent1"/>
+          </a:solidFill>
+          <a:ln w="12700" cap="flat" cmpd="sng" algn="ctr">
+            <a:solidFill>
+              <a:schemeClr val="tx1"/>
+            </a:solidFill>
+            <a:prstDash val="solid"/>
+            <a:round/>
+            <a:headEnd type="none" w="sm" len="sm"/>
+            <a:tailEnd type="triangle"/>
+          </a:ln>
+          <a:effectLst/>
+        </p:spPr>
+      </p:cxnSp>
+      <p:cxnSp>
+        <p:nvCxnSpPr>
+          <p:cNvPr id="16" name="Gerade Verbindung mit Pfeil 15">
+            <a:extLst>
+              <a:ext uri="{FF2B5EF4-FFF2-40B4-BE49-F238E27FC236}">
+                <a16:creationId xmlns:a16="http://schemas.microsoft.com/office/drawing/2014/main" id="{186B2BA1-5F69-3476-473E-45086D1C154B}"/>
+              </a:ext>
+            </a:extLst>
+          </p:cNvPr>
+          <p:cNvCxnSpPr/>
+          <p:nvPr/>
+        </p:nvCxnSpPr>
+        <p:spPr bwMode="auto">
+          <a:xfrm>
+            <a:off x="6009361" y="4725144"/>
+            <a:ext cx="1398253" cy="646692"/>
+          </a:xfrm>
+          <a:prstGeom prst="straightConnector1">
+            <a:avLst/>
+          </a:prstGeom>
+          <a:solidFill>
+            <a:schemeClr val="accent1"/>
+          </a:solidFill>
+          <a:ln w="12700" cap="flat" cmpd="sng" algn="ctr">
+            <a:solidFill>
+              <a:schemeClr val="tx1"/>
+            </a:solidFill>
+            <a:prstDash val="solid"/>
+            <a:round/>
+            <a:headEnd type="none" w="sm" len="sm"/>
+            <a:tailEnd type="triangle"/>
+          </a:ln>
+          <a:effectLst/>
+        </p:spPr>
+      </p:cxnSp>
+    </p:spTree>
+    <p:extLst>
+      <p:ext uri="{BB962C8B-B14F-4D97-AF65-F5344CB8AC3E}">
+        <p14:creationId xmlns:p14="http://schemas.microsoft.com/office/powerpoint/2010/main" val="4160710677"/>
+      </p:ext>
+    </p:extLst>
+  </p:cSld>
+  <p:clrMapOvr>
+    <a:masterClrMapping/>
+  </p:clrMapOvr>
+</p:sld>
+</file>
+
+<file path=ppt/slides/slide9.xml><?xml version="1.0" encoding="utf-8"?>
 <p:sld xmlns:a="http://schemas.openxmlformats.org/drawingml/2006/main" xmlns:r="http://schemas.openxmlformats.org/officeDocument/2006/relationships" xmlns:p="http://schemas.openxmlformats.org/presentationml/2006/main">
   <p:cSld>
     <p:spTree>
@@ -9854,224 +10577,6 @@
     <p:extLst>
       <p:ext uri="{BB962C8B-B14F-4D97-AF65-F5344CB8AC3E}">
         <p14:creationId xmlns:p14="http://schemas.microsoft.com/office/powerpoint/2010/main" val="904553298"/>
-      </p:ext>
-    </p:extLst>
-  </p:cSld>
-  <p:clrMapOvr>
-    <a:masterClrMapping/>
-  </p:clrMapOvr>
-</p:sld>
-</file>
-
-<file path=ppt/slides/slide9.xml><?xml version="1.0" encoding="utf-8"?>
-<p:sld xmlns:a="http://schemas.openxmlformats.org/drawingml/2006/main" xmlns:r="http://schemas.openxmlformats.org/officeDocument/2006/relationships" xmlns:p="http://schemas.openxmlformats.org/presentationml/2006/main">
-  <p:cSld>
-    <p:spTree>
-      <p:nvGrpSpPr>
-        <p:cNvPr id="1" name=""/>
-        <p:cNvGrpSpPr/>
-        <p:nvPr/>
-      </p:nvGrpSpPr>
-      <p:grpSpPr>
-        <a:xfrm>
-          <a:off x="0" y="0"/>
-          <a:ext cx="0" cy="0"/>
-          <a:chOff x="0" y="0"/>
-          <a:chExt cx="0" cy="0"/>
-        </a:xfrm>
-      </p:grpSpPr>
-      <p:sp>
-        <p:nvSpPr>
-          <p:cNvPr id="2" name="Titel 1">
-            <a:extLst>
-              <a:ext uri="{FF2B5EF4-FFF2-40B4-BE49-F238E27FC236}">
-                <a16:creationId xmlns:a16="http://schemas.microsoft.com/office/drawing/2014/main" id="{DCC790D7-E6E3-398A-4B67-16E1FB9913F6}"/>
-              </a:ext>
-            </a:extLst>
-          </p:cNvPr>
-          <p:cNvSpPr>
-            <a:spLocks noGrp="1"/>
-          </p:cNvSpPr>
-          <p:nvPr>
-            <p:ph type="title"/>
-          </p:nvPr>
-        </p:nvSpPr>
-        <p:spPr/>
-        <p:txBody>
-          <a:bodyPr/>
-          <a:lstStyle/>
-          <a:p>
-            <a:r>
-              <a:rPr lang="de-DE" altLang="de-DE" dirty="0"/>
-              <a:t>Lokale Entwicklung mit Docker</a:t>
-            </a:r>
-            <a:endParaRPr lang="de-DE" dirty="0"/>
-          </a:p>
-        </p:txBody>
-      </p:sp>
-      <p:sp>
-        <p:nvSpPr>
-          <p:cNvPr id="3" name="Inhaltsplatzhalter 2">
-            <a:extLst>
-              <a:ext uri="{FF2B5EF4-FFF2-40B4-BE49-F238E27FC236}">
-                <a16:creationId xmlns:a16="http://schemas.microsoft.com/office/drawing/2014/main" id="{684639B2-6C8D-6B20-E376-7BC7E127E617}"/>
-              </a:ext>
-            </a:extLst>
-          </p:cNvPr>
-          <p:cNvSpPr>
-            <a:spLocks noGrp="1"/>
-          </p:cNvSpPr>
-          <p:nvPr>
-            <p:ph idx="1"/>
-          </p:nvPr>
-        </p:nvSpPr>
-        <p:spPr>
-          <a:xfrm>
-            <a:off x="303213" y="2132856"/>
-            <a:ext cx="8516937" cy="1296144"/>
-          </a:xfrm>
-        </p:spPr>
-        <p:txBody>
-          <a:bodyPr/>
-          <a:lstStyle/>
-          <a:p>
-            <a:pPr>
-              <a:buFont typeface="Arial" panose="020B0604020202020204" pitchFamily="34" charset="0"/>
-              <a:buChar char="•"/>
-            </a:pPr>
-            <a:r>
-              <a:rPr lang="de-DE" dirty="0"/>
-              <a:t>Erstellung mittels </a:t>
-            </a:r>
-            <a:r>
-              <a:rPr lang="de-DE" dirty="0" err="1"/>
-              <a:t>Dockerfile</a:t>
-            </a:r>
-            <a:endParaRPr lang="de-DE" dirty="0"/>
-          </a:p>
-          <a:p>
-            <a:pPr>
-              <a:buFont typeface="Arial" panose="020B0604020202020204" pitchFamily="34" charset="0"/>
-              <a:buChar char="•"/>
-            </a:pPr>
-            <a:r>
-              <a:rPr lang="de-DE" dirty="0"/>
-              <a:t>Definiert die einzelnen Schichten</a:t>
-            </a:r>
-          </a:p>
-          <a:p>
-            <a:pPr>
-              <a:buFont typeface="Arial" panose="020B0604020202020204" pitchFamily="34" charset="0"/>
-              <a:buChar char="•"/>
-            </a:pPr>
-            <a:r>
-              <a:rPr lang="de-DE" dirty="0"/>
-              <a:t>Schichten werden </a:t>
-            </a:r>
-            <a:r>
-              <a:rPr lang="de-DE" dirty="0" err="1"/>
-              <a:t>gecached</a:t>
-            </a:r>
-            <a:endParaRPr lang="de-DE" dirty="0"/>
-          </a:p>
-          <a:p>
-            <a:pPr marL="0" indent="0">
-              <a:buNone/>
-            </a:pPr>
-            <a:endParaRPr lang="de-DE" dirty="0"/>
-          </a:p>
-          <a:p>
-            <a:pPr>
-              <a:buFont typeface="Arial" panose="020B0604020202020204" pitchFamily="34" charset="0"/>
-              <a:buChar char="•"/>
-            </a:pPr>
-            <a:endParaRPr lang="de-DE" dirty="0"/>
-          </a:p>
-        </p:txBody>
-      </p:sp>
-      <p:sp>
-        <p:nvSpPr>
-          <p:cNvPr id="4" name="Textfeld 3">
-            <a:extLst>
-              <a:ext uri="{FF2B5EF4-FFF2-40B4-BE49-F238E27FC236}">
-                <a16:creationId xmlns:a16="http://schemas.microsoft.com/office/drawing/2014/main" id="{517F76CB-91F9-E4B6-387A-CC772F30AFA9}"/>
-              </a:ext>
-            </a:extLst>
-          </p:cNvPr>
-          <p:cNvSpPr txBox="1"/>
-          <p:nvPr/>
-        </p:nvSpPr>
-        <p:spPr bwMode="auto">
-          <a:xfrm>
-            <a:off x="285720" y="1264406"/>
-            <a:ext cx="8516937" cy="584775"/>
-          </a:xfrm>
-          <a:prstGeom prst="rect">
-            <a:avLst/>
-          </a:prstGeom>
-          <a:noFill/>
-          <a:ln w="9525">
-            <a:noFill/>
-            <a:miter lim="800000"/>
-            <a:headEnd/>
-            <a:tailEnd/>
-          </a:ln>
-        </p:spPr>
-        <p:txBody>
-          <a:bodyPr wrap="square" rtlCol="0" anchor="ctr">
-            <a:spAutoFit/>
-          </a:bodyPr>
-          <a:lstStyle/>
-          <a:p>
-            <a:pPr algn="ctr" eaLnBrk="1" hangingPunct="1"/>
-            <a:r>
-              <a:rPr lang="de-DE" sz="3200" dirty="0">
-                <a:latin typeface="+mj-lt"/>
-              </a:rPr>
-              <a:t>Erstellen von Images</a:t>
-            </a:r>
-          </a:p>
-        </p:txBody>
-      </p:sp>
-      <p:pic>
-        <p:nvPicPr>
-          <p:cNvPr id="6" name="Grafik 5">
-            <a:extLst>
-              <a:ext uri="{FF2B5EF4-FFF2-40B4-BE49-F238E27FC236}">
-                <a16:creationId xmlns:a16="http://schemas.microsoft.com/office/drawing/2014/main" id="{366E276A-F5D5-247A-7912-37944920DA79}"/>
-              </a:ext>
-            </a:extLst>
-          </p:cNvPr>
-          <p:cNvPicPr>
-            <a:picLocks noChangeAspect="1"/>
-          </p:cNvPicPr>
-          <p:nvPr/>
-        </p:nvPicPr>
-        <p:blipFill>
-          <a:blip r:embed="rId2">
-            <a:extLst>
-              <a:ext uri="{28A0092B-C50C-407E-A947-70E740481C1C}">
-                <a14:useLocalDpi xmlns:a14="http://schemas.microsoft.com/office/drawing/2010/main" val="0"/>
-              </a:ext>
-            </a:extLst>
-          </a:blip>
-          <a:srcRect/>
-          <a:stretch/>
-        </p:blipFill>
-        <p:spPr>
-          <a:xfrm>
-            <a:off x="2979741" y="3681028"/>
-            <a:ext cx="3184517" cy="2376264"/>
-          </a:xfrm>
-          <a:prstGeom prst="rect">
-            <a:avLst/>
-          </a:prstGeom>
-        </p:spPr>
-      </p:pic>
-    </p:spTree>
-    <p:extLst>
-      <p:ext uri="{BB962C8B-B14F-4D97-AF65-F5344CB8AC3E}">
-        <p14:creationId xmlns:p14="http://schemas.microsoft.com/office/powerpoint/2010/main" val="2209957316"/>
       </p:ext>
     </p:extLst>
   </p:cSld>

</xml_diff>